<commit_message>
Updated for TCP Routes
</commit_message>
<xml_diff>
--- a/docs/resources/Diagrams.pptx
+++ b/docs/resources/Diagrams.pptx
@@ -5,10 +5,11 @@
     <p:sldMasterId id="2147483648" r:id="rId1"/>
   </p:sldMasterIdLst>
   <p:notesMasterIdLst>
-    <p:notesMasterId r:id="rId3"/>
+    <p:notesMasterId r:id="rId4"/>
   </p:notesMasterIdLst>
   <p:sldIdLst>
     <p:sldId id="257" r:id="rId2"/>
+    <p:sldId id="258" r:id="rId3"/>
   </p:sldIdLst>
   <p:sldSz cx="12192000" cy="6858000"/>
   <p:notesSz cx="6858000" cy="9144000"/>
@@ -197,7 +198,7 @@
           <a:p>
             <a:fld id="{E25CAE56-4D7F-4928-BA7D-28FF010C404B}" type="datetimeFigureOut">
               <a:rPr lang="en-CA" smtClean="0"/>
-              <a:t>24/08/2016</a:t>
+              <a:t>19/09/2017</a:t>
             </a:fld>
             <a:endParaRPr lang="en-CA"/>
           </a:p>
@@ -611,6 +612,152 @@
 </p:notes>
 </file>
 
+<file path=ppt/notesSlides/notesSlide2.xml><?xml version="1.0" encoding="utf-8"?>
+<p:notes xmlns:a="http://schemas.openxmlformats.org/drawingml/2006/main" xmlns:r="http://schemas.openxmlformats.org/officeDocument/2006/relationships" xmlns:p="http://schemas.openxmlformats.org/presentationml/2006/main">
+  <p:cSld>
+    <p:spTree>
+      <p:nvGrpSpPr>
+        <p:cNvPr id="1" name=""/>
+        <p:cNvGrpSpPr/>
+        <p:nvPr/>
+      </p:nvGrpSpPr>
+      <p:grpSpPr>
+        <a:xfrm>
+          <a:off x="0" y="0"/>
+          <a:ext cx="0" cy="0"/>
+          <a:chOff x="0" y="0"/>
+          <a:chExt cx="0" cy="0"/>
+        </a:xfrm>
+      </p:grpSpPr>
+      <p:sp>
+        <p:nvSpPr>
+          <p:cNvPr id="2" name="Slide Image Placeholder 1"/>
+          <p:cNvSpPr>
+            <a:spLocks noGrp="1" noRot="1" noChangeAspect="1"/>
+          </p:cNvSpPr>
+          <p:nvPr>
+            <p:ph type="sldImg"/>
+          </p:nvPr>
+        </p:nvSpPr>
+        <p:spPr/>
+      </p:sp>
+      <p:sp>
+        <p:nvSpPr>
+          <p:cNvPr id="3" name="Notes Placeholder 2"/>
+          <p:cNvSpPr>
+            <a:spLocks noGrp="1"/>
+          </p:cNvSpPr>
+          <p:nvPr>
+            <p:ph type="body" idx="1"/>
+          </p:nvPr>
+        </p:nvSpPr>
+        <p:spPr/>
+        <p:txBody>
+          <a:bodyPr/>
+          <a:lstStyle/>
+          <a:p>
+            <a:r>
+              <a:rPr lang="en-CA" dirty="0"/>
+              <a:t>Point of this slide is to introduce</a:t>
+            </a:r>
+            <a:r>
+              <a:rPr lang="en-CA" baseline="0" dirty="0"/>
+              <a:t> the actual messaging demo.</a:t>
+            </a:r>
+          </a:p>
+          <a:p>
+            <a:endParaRPr lang="en-CA" baseline="0" dirty="0"/>
+          </a:p>
+          <a:p>
+            <a:pPr marL="171450" indent="-171450">
+              <a:buFont typeface="Arial" panose="020B0604020202020204" pitchFamily="34" charset="0"/>
+              <a:buChar char="•"/>
+            </a:pPr>
+            <a:r>
+              <a:rPr lang="en-CA" baseline="0" dirty="0"/>
+              <a:t>Call out that this is a worker offload pattern. This pattern almost always uses messages to hit the backend applications. Hence the choice here.</a:t>
+            </a:r>
+          </a:p>
+          <a:p>
+            <a:pPr marL="171450" indent="-171450">
+              <a:buFont typeface="Arial" panose="020B0604020202020204" pitchFamily="34" charset="0"/>
+              <a:buChar char="•"/>
+            </a:pPr>
+            <a:r>
+              <a:rPr lang="en-CA" baseline="0" dirty="0"/>
+              <a:t>We are simulating work by allowing min / max work time, count and request rate to be specified in the Web Dashboard.</a:t>
+            </a:r>
+          </a:p>
+          <a:p>
+            <a:pPr marL="171450" indent="-171450">
+              <a:buFont typeface="Arial" panose="020B0604020202020204" pitchFamily="34" charset="0"/>
+              <a:buChar char="•"/>
+            </a:pPr>
+            <a:r>
+              <a:rPr lang="en-CA" baseline="0" dirty="0"/>
+              <a:t>Here you can demo horizontal scaling of the back end using cloud foundry commands to scale. </a:t>
+            </a:r>
+          </a:p>
+          <a:p>
+            <a:pPr marL="171450" indent="-171450">
+              <a:buFont typeface="Arial" panose="020B0604020202020204" pitchFamily="34" charset="0"/>
+              <a:buChar char="•"/>
+            </a:pPr>
+            <a:r>
+              <a:rPr lang="en-CA" baseline="0" dirty="0"/>
+              <a:t>Non-Exclusive queue on Solace makes that all work seamlessly and the latencies will simply decrease.</a:t>
+            </a:r>
+          </a:p>
+          <a:p>
+            <a:pPr marL="171450" indent="-171450">
+              <a:buFont typeface="Arial" panose="020B0604020202020204" pitchFamily="34" charset="0"/>
+              <a:buChar char="•"/>
+            </a:pPr>
+            <a:r>
+              <a:rPr lang="en-CA" baseline="0" dirty="0"/>
+              <a:t>This is only true if the send rate is higher than the process rate. I.e. you need a backlog in your queue for horizontal scaling to work nicely.</a:t>
+            </a:r>
+            <a:endParaRPr lang="en-CA" dirty="0"/>
+          </a:p>
+        </p:txBody>
+      </p:sp>
+      <p:sp>
+        <p:nvSpPr>
+          <p:cNvPr id="4" name="Slide Number Placeholder 3"/>
+          <p:cNvSpPr>
+            <a:spLocks noGrp="1"/>
+          </p:cNvSpPr>
+          <p:nvPr>
+            <p:ph type="sldNum" sz="quarter" idx="10"/>
+          </p:nvPr>
+        </p:nvSpPr>
+        <p:spPr/>
+        <p:txBody>
+          <a:bodyPr/>
+          <a:lstStyle/>
+          <a:p>
+            <a:fld id="{242BA0F2-874B-FE43-A00D-0C6FADBDB50D}" type="slidenum">
+              <a:rPr lang="en-US" smtClean="0"/>
+              <a:pPr/>
+              <a:t>2</a:t>
+            </a:fld>
+            <a:endParaRPr lang="en-US"/>
+          </a:p>
+        </p:txBody>
+      </p:sp>
+    </p:spTree>
+    <p:extLst>
+      <p:ext uri="{BB962C8B-B14F-4D97-AF65-F5344CB8AC3E}">
+        <p14:creationId xmlns:p14="http://schemas.microsoft.com/office/powerpoint/2010/main" val="1803355805"/>
+      </p:ext>
+    </p:extLst>
+  </p:cSld>
+  <p:clrMapOvr>
+    <a:masterClrMapping/>
+  </p:clrMapOvr>
+</p:notes>
+</file>
+
 <file path=ppt/slideLayouts/slideLayout1.xml><?xml version="1.0" encoding="utf-8"?>
 <p:sldLayout xmlns:a="http://schemas.openxmlformats.org/drawingml/2006/main" xmlns:r="http://schemas.openxmlformats.org/officeDocument/2006/relationships" xmlns:p="http://schemas.openxmlformats.org/presentationml/2006/main" type="title" preserve="1">
   <p:cSld name="Title Slide">
@@ -742,7 +889,7 @@
           <a:p>
             <a:fld id="{858878DD-8534-4088-8268-03F34D0C435B}" type="datetimeFigureOut">
               <a:rPr lang="en-CA" smtClean="0"/>
-              <a:t>24/08/2016</a:t>
+              <a:t>19/09/2017</a:t>
             </a:fld>
             <a:endParaRPr lang="en-CA"/>
           </a:p>
@@ -912,7 +1059,7 @@
           <a:p>
             <a:fld id="{858878DD-8534-4088-8268-03F34D0C435B}" type="datetimeFigureOut">
               <a:rPr lang="en-CA" smtClean="0"/>
-              <a:t>24/08/2016</a:t>
+              <a:t>19/09/2017</a:t>
             </a:fld>
             <a:endParaRPr lang="en-CA"/>
           </a:p>
@@ -1092,7 +1239,7 @@
           <a:p>
             <a:fld id="{858878DD-8534-4088-8268-03F34D0C435B}" type="datetimeFigureOut">
               <a:rPr lang="en-CA" smtClean="0"/>
-              <a:t>24/08/2016</a:t>
+              <a:t>19/09/2017</a:t>
             </a:fld>
             <a:endParaRPr lang="en-CA"/>
           </a:p>
@@ -1419,7 +1566,7 @@
           <a:p>
             <a:fld id="{858878DD-8534-4088-8268-03F34D0C435B}" type="datetimeFigureOut">
               <a:rPr lang="en-CA" smtClean="0"/>
-              <a:t>24/08/2016</a:t>
+              <a:t>19/09/2017</a:t>
             </a:fld>
             <a:endParaRPr lang="en-CA"/>
           </a:p>
@@ -1665,7 +1812,7 @@
           <a:p>
             <a:fld id="{858878DD-8534-4088-8268-03F34D0C435B}" type="datetimeFigureOut">
               <a:rPr lang="en-CA" smtClean="0"/>
-              <a:t>24/08/2016</a:t>
+              <a:t>19/09/2017</a:t>
             </a:fld>
             <a:endParaRPr lang="en-CA"/>
           </a:p>
@@ -1897,7 +2044,7 @@
           <a:p>
             <a:fld id="{858878DD-8534-4088-8268-03F34D0C435B}" type="datetimeFigureOut">
               <a:rPr lang="en-CA" smtClean="0"/>
-              <a:t>24/08/2016</a:t>
+              <a:t>19/09/2017</a:t>
             </a:fld>
             <a:endParaRPr lang="en-CA"/>
           </a:p>
@@ -2264,7 +2411,7 @@
           <a:p>
             <a:fld id="{858878DD-8534-4088-8268-03F34D0C435B}" type="datetimeFigureOut">
               <a:rPr lang="en-CA" smtClean="0"/>
-              <a:t>24/08/2016</a:t>
+              <a:t>19/09/2017</a:t>
             </a:fld>
             <a:endParaRPr lang="en-CA"/>
           </a:p>
@@ -2382,7 +2529,7 @@
           <a:p>
             <a:fld id="{858878DD-8534-4088-8268-03F34D0C435B}" type="datetimeFigureOut">
               <a:rPr lang="en-CA" smtClean="0"/>
-              <a:t>24/08/2016</a:t>
+              <a:t>19/09/2017</a:t>
             </a:fld>
             <a:endParaRPr lang="en-CA"/>
           </a:p>
@@ -2477,7 +2624,7 @@
           <a:p>
             <a:fld id="{858878DD-8534-4088-8268-03F34D0C435B}" type="datetimeFigureOut">
               <a:rPr lang="en-CA" smtClean="0"/>
-              <a:t>24/08/2016</a:t>
+              <a:t>19/09/2017</a:t>
             </a:fld>
             <a:endParaRPr lang="en-CA"/>
           </a:p>
@@ -2754,7 +2901,7 @@
           <a:p>
             <a:fld id="{858878DD-8534-4088-8268-03F34D0C435B}" type="datetimeFigureOut">
               <a:rPr lang="en-CA" smtClean="0"/>
-              <a:t>24/08/2016</a:t>
+              <a:t>19/09/2017</a:t>
             </a:fld>
             <a:endParaRPr lang="en-CA"/>
           </a:p>
@@ -3007,7 +3154,7 @@
           <a:p>
             <a:fld id="{858878DD-8534-4088-8268-03F34D0C435B}" type="datetimeFigureOut">
               <a:rPr lang="en-CA" smtClean="0"/>
-              <a:t>24/08/2016</a:t>
+              <a:t>19/09/2017</a:t>
             </a:fld>
             <a:endParaRPr lang="en-CA"/>
           </a:p>
@@ -3220,7 +3367,7 @@
           <a:p>
             <a:fld id="{858878DD-8534-4088-8268-03F34D0C435B}" type="datetimeFigureOut">
               <a:rPr lang="en-CA" smtClean="0"/>
-              <a:t>24/08/2016</a:t>
+              <a:t>19/09/2017</a:t>
             </a:fld>
             <a:endParaRPr lang="en-CA"/>
           </a:p>
@@ -4182,7 +4329,7 @@
             <p:nvPr/>
           </p:nvPicPr>
           <p:blipFill>
-            <a:blip r:embed="rId3">
+            <a:blip r:embed="rId3" cstate="print">
               <a:extLst>
                 <a:ext uri="{28A0092B-C50C-407E-A947-70E740481C1C}">
                   <a14:useLocalDpi xmlns:a14="http://schemas.microsoft.com/office/drawing/2010/main" val="0"/>
@@ -5228,7 +5375,7 @@
               <p:nvPr/>
             </p:nvPicPr>
             <p:blipFill>
-              <a:blip r:embed="rId6">
+              <a:blip r:embed="rId6" cstate="print">
                 <a:extLst>
                   <a:ext uri="{28A0092B-C50C-407E-A947-70E740481C1C}">
                     <a14:useLocalDpi xmlns:a14="http://schemas.microsoft.com/office/drawing/2010/main" val="0"/>
@@ -5269,7 +5416,7 @@
               <p:nvPr/>
             </p:nvPicPr>
             <p:blipFill rotWithShape="1">
-              <a:blip r:embed="rId7">
+              <a:blip r:embed="rId7" cstate="print">
                 <a:extLst>
                   <a:ext uri="{28A0092B-C50C-407E-A947-70E740481C1C}">
                     <a14:useLocalDpi xmlns:a14="http://schemas.microsoft.com/office/drawing/2010/main" val="0"/>
@@ -5374,7 +5521,7 @@
           <p:nvPr/>
         </p:nvPicPr>
         <p:blipFill>
-          <a:blip r:embed="rId8">
+          <a:blip r:embed="rId9" cstate="print">
             <a:extLst>
               <a:ext uri="{28A0092B-C50C-407E-A947-70E740481C1C}">
                 <a14:useLocalDpi xmlns:a14="http://schemas.microsoft.com/office/drawing/2010/main" val="0"/>
@@ -5438,7 +5585,7 @@
           <p:nvPr/>
         </p:nvPicPr>
         <p:blipFill>
-          <a:blip r:embed="rId8">
+          <a:blip r:embed="rId9" cstate="print">
             <a:extLst>
               <a:ext uri="{28A0092B-C50C-407E-A947-70E740481C1C}">
                 <a14:useLocalDpi xmlns:a14="http://schemas.microsoft.com/office/drawing/2010/main" val="0"/>
@@ -6705,6 +6852,3217 @@
     <p:extLst>
       <p:ext uri="{BB962C8B-B14F-4D97-AF65-F5344CB8AC3E}">
         <p14:creationId xmlns:p14="http://schemas.microsoft.com/office/powerpoint/2010/main" val="2612146013"/>
+      </p:ext>
+    </p:extLst>
+  </p:cSld>
+  <p:clrMapOvr>
+    <a:masterClrMapping/>
+  </p:clrMapOvr>
+</p:sld>
+</file>
+
+<file path=ppt/slides/slide2.xml><?xml version="1.0" encoding="utf-8"?>
+<p:sld xmlns:a="http://schemas.openxmlformats.org/drawingml/2006/main" xmlns:r="http://schemas.openxmlformats.org/officeDocument/2006/relationships" xmlns:p="http://schemas.openxmlformats.org/presentationml/2006/main">
+  <p:cSld>
+    <p:spTree>
+      <p:nvGrpSpPr>
+        <p:cNvPr id="1" name=""/>
+        <p:cNvGrpSpPr/>
+        <p:nvPr/>
+      </p:nvGrpSpPr>
+      <p:grpSpPr>
+        <a:xfrm>
+          <a:off x="0" y="0"/>
+          <a:ext cx="0" cy="0"/>
+          <a:chOff x="0" y="0"/>
+          <a:chExt cx="0" cy="0"/>
+        </a:xfrm>
+      </p:grpSpPr>
+      <p:sp>
+        <p:nvSpPr>
+          <p:cNvPr id="3" name="Cloud 2"/>
+          <p:cNvSpPr/>
+          <p:nvPr/>
+        </p:nvSpPr>
+        <p:spPr>
+          <a:xfrm>
+            <a:off x="312769" y="4484550"/>
+            <a:ext cx="2757185" cy="2288887"/>
+          </a:xfrm>
+          <a:prstGeom prst="cloud">
+            <a:avLst/>
+          </a:prstGeom>
+          <a:solidFill>
+            <a:schemeClr val="accent6">
+              <a:lumMod val="20000"/>
+              <a:lumOff val="80000"/>
+            </a:schemeClr>
+          </a:solidFill>
+        </p:spPr>
+        <p:style>
+          <a:lnRef idx="2">
+            <a:schemeClr val="accent1">
+              <a:shade val="50000"/>
+            </a:schemeClr>
+          </a:lnRef>
+          <a:fillRef idx="1">
+            <a:schemeClr val="accent1"/>
+          </a:fillRef>
+          <a:effectRef idx="0">
+            <a:schemeClr val="accent1"/>
+          </a:effectRef>
+          <a:fontRef idx="minor">
+            <a:schemeClr val="lt1"/>
+          </a:fontRef>
+        </p:style>
+        <p:txBody>
+          <a:bodyPr rtlCol="0" anchor="ctr"/>
+          <a:lstStyle/>
+          <a:p>
+            <a:pPr algn="ctr"/>
+            <a:endParaRPr lang="en-CA"/>
+          </a:p>
+        </p:txBody>
+      </p:sp>
+      <p:sp>
+        <p:nvSpPr>
+          <p:cNvPr id="118" name="Rectangle 117"/>
+          <p:cNvSpPr/>
+          <p:nvPr/>
+        </p:nvSpPr>
+        <p:spPr bwMode="auto">
+          <a:xfrm>
+            <a:off x="3676650" y="4458170"/>
+            <a:ext cx="7772399" cy="2329037"/>
+          </a:xfrm>
+          <a:prstGeom prst="rect">
+            <a:avLst/>
+          </a:prstGeom>
+          <a:ln>
+            <a:headEnd type="none" w="med" len="med"/>
+            <a:tailEnd type="none" w="med" len="med"/>
+          </a:ln>
+        </p:spPr>
+        <p:style>
+          <a:lnRef idx="1">
+            <a:schemeClr val="accent1"/>
+          </a:lnRef>
+          <a:fillRef idx="2">
+            <a:schemeClr val="accent1"/>
+          </a:fillRef>
+          <a:effectRef idx="1">
+            <a:schemeClr val="accent1"/>
+          </a:effectRef>
+          <a:fontRef idx="minor">
+            <a:schemeClr val="dk1"/>
+          </a:fontRef>
+        </p:style>
+        <p:txBody>
+          <a:bodyPr vert="horz" wrap="square" lIns="91440" tIns="45720" rIns="91440" bIns="45720" numCol="1" rtlCol="0" anchor="t" anchorCtr="0" compatLnSpc="1">
+            <a:prstTxWarp prst="textNoShape">
+              <a:avLst/>
+            </a:prstTxWarp>
+            <a:noAutofit/>
+          </a:bodyPr>
+          <a:lstStyle/>
+          <a:p>
+            <a:pPr marL="342900" marR="0" indent="-342900" algn="l" defTabSz="914400" rtl="0" eaLnBrk="1" fontAlgn="base" latinLnBrk="0" hangingPunct="1">
+              <a:lnSpc>
+                <a:spcPct val="80000"/>
+              </a:lnSpc>
+              <a:spcBef>
+                <a:spcPct val="20000"/>
+              </a:spcBef>
+              <a:spcAft>
+                <a:spcPct val="0"/>
+              </a:spcAft>
+              <a:buClr>
+                <a:schemeClr val="hlink"/>
+              </a:buClr>
+              <a:buSzPct val="60000"/>
+              <a:buFont typeface="Arial Narrow" pitchFamily="34" charset="0"/>
+              <a:buNone/>
+              <a:tabLst/>
+            </a:pPr>
+            <a:endParaRPr kumimoji="0" lang="en-CA" sz="2000" b="1" i="0" u="none" strike="noStrike" cap="none" normalizeH="0" baseline="0">
+              <a:ln>
+                <a:noFill/>
+              </a:ln>
+              <a:solidFill>
+                <a:schemeClr val="tx1"/>
+              </a:solidFill>
+              <a:effectLst/>
+              <a:latin typeface="Arial" charset="0"/>
+            </a:endParaRPr>
+          </a:p>
+        </p:txBody>
+      </p:sp>
+      <p:sp>
+        <p:nvSpPr>
+          <p:cNvPr id="9" name="Rectangle 8"/>
+          <p:cNvSpPr/>
+          <p:nvPr/>
+        </p:nvSpPr>
+        <p:spPr bwMode="auto">
+          <a:xfrm>
+            <a:off x="3676650" y="1605708"/>
+            <a:ext cx="7772400" cy="2781300"/>
+          </a:xfrm>
+          <a:prstGeom prst="rect">
+            <a:avLst/>
+          </a:prstGeom>
+          <a:ln>
+            <a:headEnd type="none" w="med" len="med"/>
+            <a:tailEnd type="none" w="med" len="med"/>
+          </a:ln>
+        </p:spPr>
+        <p:style>
+          <a:lnRef idx="1">
+            <a:schemeClr val="accent1"/>
+          </a:lnRef>
+          <a:fillRef idx="2">
+            <a:schemeClr val="accent1"/>
+          </a:fillRef>
+          <a:effectRef idx="1">
+            <a:schemeClr val="accent1"/>
+          </a:effectRef>
+          <a:fontRef idx="minor">
+            <a:schemeClr val="dk1"/>
+          </a:fontRef>
+        </p:style>
+        <p:txBody>
+          <a:bodyPr vert="horz" wrap="square" lIns="91440" tIns="45720" rIns="91440" bIns="45720" numCol="1" rtlCol="0" anchor="t" anchorCtr="0" compatLnSpc="1">
+            <a:prstTxWarp prst="textNoShape">
+              <a:avLst/>
+            </a:prstTxWarp>
+            <a:noAutofit/>
+          </a:bodyPr>
+          <a:lstStyle/>
+          <a:p>
+            <a:pPr marL="342900" marR="0" indent="-342900" algn="l" defTabSz="914400" rtl="0" eaLnBrk="1" fontAlgn="base" latinLnBrk="0" hangingPunct="1">
+              <a:lnSpc>
+                <a:spcPct val="80000"/>
+              </a:lnSpc>
+              <a:spcBef>
+                <a:spcPct val="20000"/>
+              </a:spcBef>
+              <a:spcAft>
+                <a:spcPct val="0"/>
+              </a:spcAft>
+              <a:buClr>
+                <a:schemeClr val="hlink"/>
+              </a:buClr>
+              <a:buSzPct val="60000"/>
+              <a:buFont typeface="Arial Narrow" pitchFamily="34" charset="0"/>
+              <a:buNone/>
+              <a:tabLst/>
+            </a:pPr>
+            <a:endParaRPr kumimoji="0" lang="en-CA" sz="2000" b="1" i="0" u="none" strike="noStrike" cap="none" normalizeH="0" baseline="0">
+              <a:ln>
+                <a:noFill/>
+              </a:ln>
+              <a:solidFill>
+                <a:schemeClr val="tx1"/>
+              </a:solidFill>
+              <a:effectLst/>
+              <a:latin typeface="Arial" charset="0"/>
+            </a:endParaRPr>
+          </a:p>
+        </p:txBody>
+      </p:sp>
+      <p:sp>
+        <p:nvSpPr>
+          <p:cNvPr id="2" name="Title 1"/>
+          <p:cNvSpPr>
+            <a:spLocks noGrp="1"/>
+          </p:cNvSpPr>
+          <p:nvPr>
+            <p:ph type="title"/>
+          </p:nvPr>
+        </p:nvSpPr>
+        <p:spPr/>
+        <p:txBody>
+          <a:bodyPr>
+            <a:normAutofit fontScale="90000"/>
+          </a:bodyPr>
+          <a:lstStyle/>
+          <a:p>
+            <a:r>
+              <a:rPr lang="en-CA" dirty="0"/>
+              <a:t>Demo – Solace Cloud Messaging Sample Application</a:t>
+            </a:r>
+          </a:p>
+        </p:txBody>
+      </p:sp>
+      <p:sp>
+        <p:nvSpPr>
+          <p:cNvPr id="11" name="Oval 10"/>
+          <p:cNvSpPr/>
+          <p:nvPr/>
+        </p:nvSpPr>
+        <p:spPr bwMode="auto">
+          <a:xfrm>
+            <a:off x="9240736" y="2844124"/>
+            <a:ext cx="1438275" cy="1390651"/>
+          </a:xfrm>
+          <a:prstGeom prst="ellipse">
+            <a:avLst/>
+          </a:prstGeom>
+          <a:ln>
+            <a:headEnd type="none" w="med" len="med"/>
+            <a:tailEnd type="none" w="med" len="med"/>
+          </a:ln>
+        </p:spPr>
+        <p:style>
+          <a:lnRef idx="0">
+            <a:schemeClr val="accent1"/>
+          </a:lnRef>
+          <a:fillRef idx="3">
+            <a:schemeClr val="accent1"/>
+          </a:fillRef>
+          <a:effectRef idx="3">
+            <a:schemeClr val="accent1"/>
+          </a:effectRef>
+          <a:fontRef idx="minor">
+            <a:schemeClr val="lt1"/>
+          </a:fontRef>
+        </p:style>
+        <p:txBody>
+          <a:bodyPr vert="horz" wrap="none" lIns="91440" tIns="45720" rIns="91440" bIns="45720" numCol="1" rtlCol="0" anchor="ctr" anchorCtr="0" compatLnSpc="1">
+            <a:prstTxWarp prst="textNoShape">
+              <a:avLst/>
+            </a:prstTxWarp>
+            <a:noAutofit/>
+          </a:bodyPr>
+          <a:lstStyle/>
+          <a:p>
+            <a:pPr marL="342900" marR="0" indent="-342900" algn="ctr" defTabSz="914400" rtl="0" eaLnBrk="1" fontAlgn="base" latinLnBrk="0" hangingPunct="1">
+              <a:lnSpc>
+                <a:spcPct val="80000"/>
+              </a:lnSpc>
+              <a:spcBef>
+                <a:spcPct val="20000"/>
+              </a:spcBef>
+              <a:spcAft>
+                <a:spcPct val="0"/>
+              </a:spcAft>
+              <a:buClr>
+                <a:schemeClr val="hlink"/>
+              </a:buClr>
+              <a:buSzPct val="60000"/>
+              <a:buFont typeface="Arial Narrow" pitchFamily="34" charset="0"/>
+              <a:buNone/>
+              <a:tabLst/>
+            </a:pPr>
+            <a:r>
+              <a:rPr kumimoji="0" lang="en-CA" sz="2000" b="1" i="0" u="none" strike="noStrike" cap="none" normalizeH="0" baseline="0" dirty="0">
+                <a:ln>
+                  <a:noFill/>
+                </a:ln>
+                <a:solidFill>
+                  <a:schemeClr val="bg1"/>
+                </a:solidFill>
+                <a:effectLst/>
+                <a:latin typeface="Arial" charset="0"/>
+              </a:rPr>
+              <a:t>Solace</a:t>
+            </a:r>
+          </a:p>
+          <a:p>
+            <a:pPr marL="342900" marR="0" indent="-342900" algn="ctr" defTabSz="914400" rtl="0" eaLnBrk="1" fontAlgn="base" latinLnBrk="0" hangingPunct="1">
+              <a:lnSpc>
+                <a:spcPct val="80000"/>
+              </a:lnSpc>
+              <a:spcBef>
+                <a:spcPct val="20000"/>
+              </a:spcBef>
+              <a:spcAft>
+                <a:spcPct val="0"/>
+              </a:spcAft>
+              <a:buClr>
+                <a:schemeClr val="hlink"/>
+              </a:buClr>
+              <a:buSzPct val="60000"/>
+              <a:buFont typeface="Arial Narrow" pitchFamily="34" charset="0"/>
+              <a:buNone/>
+              <a:tabLst/>
+            </a:pPr>
+            <a:r>
+              <a:rPr lang="en-CA" sz="2000" b="1" dirty="0">
+                <a:solidFill>
+                  <a:schemeClr val="bg1"/>
+                </a:solidFill>
+                <a:latin typeface="Arial" charset="0"/>
+              </a:rPr>
+              <a:t>Service</a:t>
+            </a:r>
+          </a:p>
+          <a:p>
+            <a:pPr marL="342900" marR="0" indent="-342900" algn="ctr" defTabSz="914400" rtl="0" eaLnBrk="1" fontAlgn="base" latinLnBrk="0" hangingPunct="1">
+              <a:lnSpc>
+                <a:spcPct val="80000"/>
+              </a:lnSpc>
+              <a:spcBef>
+                <a:spcPct val="20000"/>
+              </a:spcBef>
+              <a:spcAft>
+                <a:spcPct val="0"/>
+              </a:spcAft>
+              <a:buClr>
+                <a:schemeClr val="hlink"/>
+              </a:buClr>
+              <a:buSzPct val="60000"/>
+              <a:buFont typeface="Arial Narrow" pitchFamily="34" charset="0"/>
+              <a:buNone/>
+              <a:tabLst/>
+            </a:pPr>
+            <a:r>
+              <a:rPr kumimoji="0" lang="en-CA" sz="2000" b="1" i="0" u="none" strike="noStrike" cap="none" normalizeH="0" baseline="0" dirty="0">
+                <a:ln>
+                  <a:noFill/>
+                </a:ln>
+                <a:solidFill>
+                  <a:schemeClr val="bg1"/>
+                </a:solidFill>
+                <a:effectLst/>
+                <a:latin typeface="Arial" charset="0"/>
+              </a:rPr>
+              <a:t>Broker</a:t>
+            </a:r>
+          </a:p>
+        </p:txBody>
+      </p:sp>
+      <p:sp>
+        <p:nvSpPr>
+          <p:cNvPr id="12" name="Rectangle 11"/>
+          <p:cNvSpPr/>
+          <p:nvPr/>
+        </p:nvSpPr>
+        <p:spPr bwMode="auto">
+          <a:xfrm>
+            <a:off x="4572000" y="1670763"/>
+            <a:ext cx="3800475" cy="424279"/>
+          </a:xfrm>
+          <a:prstGeom prst="rect">
+            <a:avLst/>
+          </a:prstGeom>
+          <a:ln>
+            <a:headEnd type="none" w="med" len="med"/>
+            <a:tailEnd type="none" w="med" len="med"/>
+          </a:ln>
+        </p:spPr>
+        <p:style>
+          <a:lnRef idx="0">
+            <a:schemeClr val="accent5"/>
+          </a:lnRef>
+          <a:fillRef idx="3">
+            <a:schemeClr val="accent5"/>
+          </a:fillRef>
+          <a:effectRef idx="3">
+            <a:schemeClr val="accent5"/>
+          </a:effectRef>
+          <a:fontRef idx="minor">
+            <a:schemeClr val="lt1"/>
+          </a:fontRef>
+        </p:style>
+        <p:txBody>
+          <a:bodyPr vert="horz" wrap="square" lIns="91440" tIns="45720" rIns="91440" bIns="45720" numCol="1" rtlCol="0" anchor="ctr" anchorCtr="0" compatLnSpc="1">
+            <a:prstTxWarp prst="textNoShape">
+              <a:avLst/>
+            </a:prstTxWarp>
+            <a:noAutofit/>
+          </a:bodyPr>
+          <a:lstStyle/>
+          <a:p>
+            <a:pPr marL="342900" marR="0" indent="-342900" algn="ctr" defTabSz="914400" rtl="0" eaLnBrk="1" fontAlgn="base" latinLnBrk="0" hangingPunct="1">
+              <a:lnSpc>
+                <a:spcPct val="80000"/>
+              </a:lnSpc>
+              <a:spcBef>
+                <a:spcPct val="20000"/>
+              </a:spcBef>
+              <a:spcAft>
+                <a:spcPct val="0"/>
+              </a:spcAft>
+              <a:buClr>
+                <a:schemeClr val="hlink"/>
+              </a:buClr>
+              <a:buSzPct val="60000"/>
+              <a:buFont typeface="Arial Narrow" pitchFamily="34" charset="0"/>
+              <a:buNone/>
+              <a:tabLst/>
+            </a:pPr>
+            <a:r>
+              <a:rPr kumimoji="0" lang="en-CA" sz="2000" i="0" u="none" strike="noStrike" cap="none" normalizeH="0" baseline="0" dirty="0">
+                <a:ln>
+                  <a:noFill/>
+                </a:ln>
+                <a:solidFill>
+                  <a:schemeClr val="tx1"/>
+                </a:solidFill>
+                <a:effectLst/>
+                <a:latin typeface="Arial" charset="0"/>
+              </a:rPr>
+              <a:t>Cloud Controller</a:t>
+            </a:r>
+          </a:p>
+        </p:txBody>
+      </p:sp>
+      <p:sp>
+        <p:nvSpPr>
+          <p:cNvPr id="17" name="Rectangle 16"/>
+          <p:cNvSpPr/>
+          <p:nvPr/>
+        </p:nvSpPr>
+        <p:spPr bwMode="auto">
+          <a:xfrm rot="16200000">
+            <a:off x="2785016" y="2823530"/>
+            <a:ext cx="2402396" cy="424279"/>
+          </a:xfrm>
+          <a:prstGeom prst="rect">
+            <a:avLst/>
+          </a:prstGeom>
+          <a:ln>
+            <a:headEnd type="none" w="med" len="med"/>
+            <a:tailEnd type="none" w="med" len="med"/>
+          </a:ln>
+        </p:spPr>
+        <p:style>
+          <a:lnRef idx="0">
+            <a:schemeClr val="accent5"/>
+          </a:lnRef>
+          <a:fillRef idx="3">
+            <a:schemeClr val="accent5"/>
+          </a:fillRef>
+          <a:effectRef idx="3">
+            <a:schemeClr val="accent5"/>
+          </a:effectRef>
+          <a:fontRef idx="minor">
+            <a:schemeClr val="lt1"/>
+          </a:fontRef>
+        </p:style>
+        <p:txBody>
+          <a:bodyPr vert="horz" wrap="square" lIns="91440" tIns="45720" rIns="91440" bIns="45720" numCol="1" rtlCol="0" anchor="ctr" anchorCtr="0" compatLnSpc="1">
+            <a:prstTxWarp prst="textNoShape">
+              <a:avLst/>
+            </a:prstTxWarp>
+            <a:noAutofit/>
+          </a:bodyPr>
+          <a:lstStyle/>
+          <a:p>
+            <a:pPr marL="342900" marR="0" indent="-342900" algn="ctr" defTabSz="914400" rtl="0" eaLnBrk="1" fontAlgn="base" latinLnBrk="0" hangingPunct="1">
+              <a:lnSpc>
+                <a:spcPct val="80000"/>
+              </a:lnSpc>
+              <a:spcBef>
+                <a:spcPct val="20000"/>
+              </a:spcBef>
+              <a:spcAft>
+                <a:spcPct val="0"/>
+              </a:spcAft>
+              <a:buClr>
+                <a:schemeClr val="hlink"/>
+              </a:buClr>
+              <a:buSzPct val="60000"/>
+              <a:buFont typeface="Arial Narrow" pitchFamily="34" charset="0"/>
+              <a:buNone/>
+              <a:tabLst/>
+            </a:pPr>
+            <a:r>
+              <a:rPr kumimoji="0" lang="en-CA" i="0" u="none" strike="noStrike" cap="none" normalizeH="0" baseline="0" dirty="0">
+                <a:ln>
+                  <a:noFill/>
+                </a:ln>
+                <a:solidFill>
+                  <a:schemeClr val="tx1"/>
+                </a:solidFill>
+                <a:effectLst/>
+                <a:latin typeface="Arial" charset="0"/>
+              </a:rPr>
+              <a:t>Router</a:t>
+            </a:r>
+          </a:p>
+        </p:txBody>
+      </p:sp>
+      <p:grpSp>
+        <p:nvGrpSpPr>
+          <p:cNvPr id="117" name="Group 116"/>
+          <p:cNvGrpSpPr/>
+          <p:nvPr/>
+        </p:nvGrpSpPr>
+        <p:grpSpPr>
+          <a:xfrm>
+            <a:off x="1187811" y="1912652"/>
+            <a:ext cx="1427835" cy="1000688"/>
+            <a:chOff x="1000039" y="1912652"/>
+            <a:chExt cx="1427835" cy="1000688"/>
+          </a:xfrm>
+        </p:grpSpPr>
+        <p:sp>
+          <p:nvSpPr>
+            <p:cNvPr id="116" name="Rectangle 115"/>
+            <p:cNvSpPr/>
+            <p:nvPr/>
+          </p:nvSpPr>
+          <p:spPr bwMode="auto">
+            <a:xfrm>
+              <a:off x="1000039" y="1912652"/>
+              <a:ext cx="1427835" cy="1000688"/>
+            </a:xfrm>
+            <a:prstGeom prst="rect">
+              <a:avLst/>
+            </a:prstGeom>
+            <a:ln>
+              <a:headEnd type="none" w="med" len="med"/>
+              <a:tailEnd type="none" w="med" len="med"/>
+            </a:ln>
+          </p:spPr>
+          <p:style>
+            <a:lnRef idx="1">
+              <a:schemeClr val="accent3"/>
+            </a:lnRef>
+            <a:fillRef idx="2">
+              <a:schemeClr val="accent3"/>
+            </a:fillRef>
+            <a:effectRef idx="1">
+              <a:schemeClr val="accent3"/>
+            </a:effectRef>
+            <a:fontRef idx="minor">
+              <a:schemeClr val="dk1"/>
+            </a:fontRef>
+          </p:style>
+          <p:txBody>
+            <a:bodyPr vert="horz" wrap="square" lIns="91440" tIns="45720" rIns="91440" bIns="45720" numCol="1" rtlCol="0" anchor="t" anchorCtr="0" compatLnSpc="1">
+              <a:prstTxWarp prst="textNoShape">
+                <a:avLst/>
+              </a:prstTxWarp>
+              <a:spAutoFit/>
+            </a:bodyPr>
+            <a:lstStyle/>
+            <a:p>
+              <a:pPr marL="342900" marR="0" indent="-342900" algn="l" defTabSz="914400" rtl="0" eaLnBrk="1" fontAlgn="base" latinLnBrk="0" hangingPunct="1">
+                <a:lnSpc>
+                  <a:spcPct val="80000"/>
+                </a:lnSpc>
+                <a:spcBef>
+                  <a:spcPct val="20000"/>
+                </a:spcBef>
+                <a:spcAft>
+                  <a:spcPct val="0"/>
+                </a:spcAft>
+                <a:buClr>
+                  <a:schemeClr val="hlink"/>
+                </a:buClr>
+                <a:buSzPct val="60000"/>
+                <a:buFont typeface="Arial Narrow" pitchFamily="34" charset="0"/>
+                <a:buNone/>
+                <a:tabLst/>
+              </a:pPr>
+              <a:endParaRPr kumimoji="0" lang="en-CA" sz="2000" b="1" i="0" u="none" strike="noStrike" cap="none" normalizeH="0" baseline="0">
+                <a:ln>
+                  <a:noFill/>
+                </a:ln>
+                <a:solidFill>
+                  <a:schemeClr val="tx1"/>
+                </a:solidFill>
+                <a:effectLst/>
+                <a:latin typeface="Arial" charset="0"/>
+              </a:endParaRPr>
+            </a:p>
+          </p:txBody>
+        </p:sp>
+        <p:pic>
+          <p:nvPicPr>
+            <p:cNvPr id="1042" name="Picture 18" descr="https://avatars1.githubusercontent.com/u/621746?v=3&amp;s=400"/>
+            <p:cNvPicPr>
+              <a:picLocks noChangeAspect="1" noChangeArrowheads="1"/>
+            </p:cNvPicPr>
+            <p:nvPr/>
+          </p:nvPicPr>
+          <p:blipFill>
+            <a:blip r:embed="rId3" cstate="print">
+              <a:extLst>
+                <a:ext uri="{28A0092B-C50C-407E-A947-70E740481C1C}">
+                  <a14:useLocalDpi xmlns:a14="http://schemas.microsoft.com/office/drawing/2010/main" val="0"/>
+                </a:ext>
+              </a:extLst>
+            </a:blip>
+            <a:srcRect/>
+            <a:stretch>
+              <a:fillRect/>
+            </a:stretch>
+          </p:blipFill>
+          <p:spPr bwMode="auto">
+            <a:xfrm>
+              <a:off x="1705791" y="2051955"/>
+              <a:ext cx="722083" cy="722083"/>
+            </a:xfrm>
+            <a:prstGeom prst="rect">
+              <a:avLst/>
+            </a:prstGeom>
+            <a:noFill/>
+            <a:extLst>
+              <a:ext uri="{909E8E84-426E-40DD-AFC4-6F175D3DCCD1}">
+                <a14:hiddenFill xmlns:a14="http://schemas.microsoft.com/office/drawing/2010/main">
+                  <a:solidFill>
+                    <a:srgbClr val="FFFFFF"/>
+                  </a:solidFill>
+                </a14:hiddenFill>
+              </a:ext>
+            </a:extLst>
+          </p:spPr>
+        </p:pic>
+        <p:sp>
+          <p:nvSpPr>
+            <p:cNvPr id="138" name="TextBox 137"/>
+            <p:cNvSpPr txBox="1"/>
+            <p:nvPr/>
+          </p:nvSpPr>
+          <p:spPr>
+            <a:xfrm>
+              <a:off x="1072974" y="2043664"/>
+              <a:ext cx="692818" cy="738664"/>
+            </a:xfrm>
+            <a:prstGeom prst="rect">
+              <a:avLst/>
+            </a:prstGeom>
+            <a:noFill/>
+          </p:spPr>
+          <p:txBody>
+            <a:bodyPr wrap="none" rtlCol="0">
+              <a:spAutoFit/>
+            </a:bodyPr>
+            <a:lstStyle/>
+            <a:p>
+              <a:pPr algn="ctr"/>
+              <a:r>
+                <a:rPr lang="en-CA" sz="1400" dirty="0"/>
+                <a:t>CF</a:t>
+              </a:r>
+            </a:p>
+            <a:p>
+              <a:pPr algn="ctr"/>
+              <a:r>
+                <a:rPr lang="en-CA" sz="1400" dirty="0"/>
+                <a:t>Admin</a:t>
+              </a:r>
+            </a:p>
+            <a:p>
+              <a:pPr algn="ctr"/>
+              <a:r>
+                <a:rPr lang="en-CA" sz="1400" dirty="0"/>
+                <a:t>CLI</a:t>
+              </a:r>
+            </a:p>
+          </p:txBody>
+        </p:sp>
+      </p:grpSp>
+      <p:sp>
+        <p:nvSpPr>
+          <p:cNvPr id="126" name="TextBox 125"/>
+          <p:cNvSpPr txBox="1"/>
+          <p:nvPr/>
+        </p:nvSpPr>
+        <p:spPr>
+          <a:xfrm>
+            <a:off x="200345" y="2100495"/>
+            <a:ext cx="776175" cy="584775"/>
+          </a:xfrm>
+          <a:prstGeom prst="rect">
+            <a:avLst/>
+          </a:prstGeom>
+          <a:noFill/>
+        </p:spPr>
+        <p:txBody>
+          <a:bodyPr wrap="none" rtlCol="0">
+            <a:spAutoFit/>
+          </a:bodyPr>
+          <a:lstStyle/>
+          <a:p>
+            <a:pPr algn="ctr"/>
+            <a:r>
+              <a:rPr lang="en-CA" sz="1600" dirty="0"/>
+              <a:t>App</a:t>
+            </a:r>
+          </a:p>
+          <a:p>
+            <a:pPr algn="ctr"/>
+            <a:r>
+              <a:rPr lang="en-CA" sz="1600" dirty="0" err="1"/>
+              <a:t>Config</a:t>
+            </a:r>
+            <a:endParaRPr lang="en-CA" sz="1600" dirty="0"/>
+          </a:p>
+        </p:txBody>
+      </p:sp>
+      <p:cxnSp>
+        <p:nvCxnSpPr>
+          <p:cNvPr id="1024" name="Straight Arrow Connector 1023"/>
+          <p:cNvCxnSpPr/>
+          <p:nvPr/>
+        </p:nvCxnSpPr>
+        <p:spPr bwMode="auto">
+          <a:xfrm>
+            <a:off x="9959873" y="3328484"/>
+            <a:ext cx="914400" cy="914400"/>
+          </a:xfrm>
+          <a:prstGeom prst="straightConnector1">
+            <a:avLst/>
+          </a:prstGeom>
+          <a:noFill/>
+          <a:ln w="9525" cap="flat" cmpd="sng" algn="ctr">
+            <a:noFill/>
+            <a:prstDash val="solid"/>
+            <a:round/>
+            <a:headEnd type="none" w="med" len="med"/>
+            <a:tailEnd type="arrow"/>
+          </a:ln>
+          <a:effectLst/>
+        </p:spPr>
+      </p:cxnSp>
+      <p:sp>
+        <p:nvSpPr>
+          <p:cNvPr id="1027" name="Freeform 1026"/>
+          <p:cNvSpPr/>
+          <p:nvPr/>
+        </p:nvSpPr>
+        <p:spPr bwMode="auto">
+          <a:xfrm>
+            <a:off x="2775857" y="2196193"/>
+            <a:ext cx="2669722" cy="143198"/>
+          </a:xfrm>
+          <a:custGeom>
+            <a:avLst/>
+            <a:gdLst>
+              <a:gd name="connsiteX0" fmla="*/ 0 w 2669722"/>
+              <a:gd name="connsiteY0" fmla="*/ 261257 h 286396"/>
+              <a:gd name="connsiteX1" fmla="*/ 2081893 w 2669722"/>
+              <a:gd name="connsiteY1" fmla="*/ 261257 h 286396"/>
+              <a:gd name="connsiteX2" fmla="*/ 2669722 w 2669722"/>
+              <a:gd name="connsiteY2" fmla="*/ 0 h 286396"/>
+            </a:gdLst>
+            <a:ahLst/>
+            <a:cxnLst>
+              <a:cxn ang="0">
+                <a:pos x="connsiteX0" y="connsiteY0"/>
+              </a:cxn>
+              <a:cxn ang="0">
+                <a:pos x="connsiteX1" y="connsiteY1"/>
+              </a:cxn>
+              <a:cxn ang="0">
+                <a:pos x="connsiteX2" y="connsiteY2"/>
+              </a:cxn>
+            </a:cxnLst>
+            <a:rect l="l" t="t" r="r" b="b"/>
+            <a:pathLst>
+              <a:path w="2669722" h="286396">
+                <a:moveTo>
+                  <a:pt x="0" y="261257"/>
+                </a:moveTo>
+                <a:cubicBezTo>
+                  <a:pt x="818469" y="283028"/>
+                  <a:pt x="1636939" y="304800"/>
+                  <a:pt x="2081893" y="261257"/>
+                </a:cubicBezTo>
+                <a:cubicBezTo>
+                  <a:pt x="2526847" y="217714"/>
+                  <a:pt x="2598284" y="108857"/>
+                  <a:pt x="2669722" y="0"/>
+                </a:cubicBezTo>
+              </a:path>
+            </a:pathLst>
+          </a:custGeom>
+          <a:ln>
+            <a:headEnd type="none" w="med" len="med"/>
+            <a:tailEnd type="triangle" w="med" len="med"/>
+          </a:ln>
+        </p:spPr>
+        <p:style>
+          <a:lnRef idx="3">
+            <a:schemeClr val="accent5"/>
+          </a:lnRef>
+          <a:fillRef idx="0">
+            <a:schemeClr val="accent5"/>
+          </a:fillRef>
+          <a:effectRef idx="2">
+            <a:schemeClr val="accent5"/>
+          </a:effectRef>
+          <a:fontRef idx="minor">
+            <a:schemeClr val="tx1"/>
+          </a:fontRef>
+        </p:style>
+        <p:txBody>
+          <a:bodyPr vert="horz" wrap="square" lIns="91440" tIns="45720" rIns="91440" bIns="45720" numCol="1" rtlCol="0" anchor="t" anchorCtr="0" compatLnSpc="1">
+            <a:prstTxWarp prst="textNoShape">
+              <a:avLst/>
+            </a:prstTxWarp>
+            <a:noAutofit/>
+          </a:bodyPr>
+          <a:lstStyle/>
+          <a:p>
+            <a:pPr marL="342900" marR="0" indent="-342900" algn="l" defTabSz="914400" rtl="0" eaLnBrk="1" fontAlgn="base" latinLnBrk="0" hangingPunct="1">
+              <a:lnSpc>
+                <a:spcPct val="80000"/>
+              </a:lnSpc>
+              <a:spcBef>
+                <a:spcPct val="20000"/>
+              </a:spcBef>
+              <a:spcAft>
+                <a:spcPct val="0"/>
+              </a:spcAft>
+              <a:buClr>
+                <a:schemeClr val="hlink"/>
+              </a:buClr>
+              <a:buSzPct val="60000"/>
+              <a:buFont typeface="Arial Narrow" pitchFamily="34" charset="0"/>
+              <a:buNone/>
+              <a:tabLst/>
+            </a:pPr>
+            <a:endParaRPr kumimoji="0" lang="en-CA" sz="2000" b="1" i="0" u="none" strike="noStrike" cap="none" normalizeH="0" baseline="0">
+              <a:ln>
+                <a:noFill/>
+              </a:ln>
+              <a:solidFill>
+                <a:schemeClr val="tx1"/>
+              </a:solidFill>
+              <a:effectLst/>
+              <a:latin typeface="Arial" charset="0"/>
+            </a:endParaRPr>
+          </a:p>
+        </p:txBody>
+      </p:sp>
+      <p:sp>
+        <p:nvSpPr>
+          <p:cNvPr id="1033" name="Freeform 1032"/>
+          <p:cNvSpPr/>
+          <p:nvPr/>
+        </p:nvSpPr>
+        <p:spPr bwMode="auto">
+          <a:xfrm>
+            <a:off x="2775857" y="2196193"/>
+            <a:ext cx="2923363" cy="350674"/>
+          </a:xfrm>
+          <a:custGeom>
+            <a:avLst/>
+            <a:gdLst>
+              <a:gd name="connsiteX0" fmla="*/ 0 w 3339193"/>
+              <a:gd name="connsiteY0" fmla="*/ 367392 h 401173"/>
+              <a:gd name="connsiteX1" fmla="*/ 2735036 w 3339193"/>
+              <a:gd name="connsiteY1" fmla="*/ 367392 h 401173"/>
+              <a:gd name="connsiteX2" fmla="*/ 3314700 w 3339193"/>
+              <a:gd name="connsiteY2" fmla="*/ 16328 h 401173"/>
+              <a:gd name="connsiteX3" fmla="*/ 3314700 w 3339193"/>
+              <a:gd name="connsiteY3" fmla="*/ 16328 h 401173"/>
+              <a:gd name="connsiteX4" fmla="*/ 3339193 w 3339193"/>
+              <a:gd name="connsiteY4" fmla="*/ 0 h 401173"/>
+            </a:gdLst>
+            <a:ahLst/>
+            <a:cxnLst>
+              <a:cxn ang="0">
+                <a:pos x="connsiteX0" y="connsiteY0"/>
+              </a:cxn>
+              <a:cxn ang="0">
+                <a:pos x="connsiteX1" y="connsiteY1"/>
+              </a:cxn>
+              <a:cxn ang="0">
+                <a:pos x="connsiteX2" y="connsiteY2"/>
+              </a:cxn>
+              <a:cxn ang="0">
+                <a:pos x="connsiteX3" y="connsiteY3"/>
+              </a:cxn>
+              <a:cxn ang="0">
+                <a:pos x="connsiteX4" y="connsiteY4"/>
+              </a:cxn>
+            </a:cxnLst>
+            <a:rect l="l" t="t" r="r" b="b"/>
+            <a:pathLst>
+              <a:path w="3339193" h="401173">
+                <a:moveTo>
+                  <a:pt x="0" y="367392"/>
+                </a:moveTo>
+                <a:cubicBezTo>
+                  <a:pt x="1091293" y="396647"/>
+                  <a:pt x="2182586" y="425903"/>
+                  <a:pt x="2735036" y="367392"/>
+                </a:cubicBezTo>
+                <a:cubicBezTo>
+                  <a:pt x="3287486" y="308881"/>
+                  <a:pt x="3314700" y="16328"/>
+                  <a:pt x="3314700" y="16328"/>
+                </a:cubicBezTo>
+                <a:lnTo>
+                  <a:pt x="3314700" y="16328"/>
+                </a:lnTo>
+                <a:lnTo>
+                  <a:pt x="3339193" y="0"/>
+                </a:lnTo>
+              </a:path>
+            </a:pathLst>
+          </a:custGeom>
+          <a:ln>
+            <a:headEnd type="none" w="med" len="med"/>
+            <a:tailEnd type="triangle" w="med" len="med"/>
+          </a:ln>
+        </p:spPr>
+        <p:style>
+          <a:lnRef idx="3">
+            <a:schemeClr val="accent5"/>
+          </a:lnRef>
+          <a:fillRef idx="0">
+            <a:schemeClr val="accent5"/>
+          </a:fillRef>
+          <a:effectRef idx="2">
+            <a:schemeClr val="accent5"/>
+          </a:effectRef>
+          <a:fontRef idx="minor">
+            <a:schemeClr val="tx1"/>
+          </a:fontRef>
+        </p:style>
+        <p:txBody>
+          <a:bodyPr vert="horz" wrap="square" lIns="91440" tIns="45720" rIns="91440" bIns="45720" numCol="1" rtlCol="0" anchor="t" anchorCtr="0" compatLnSpc="1">
+            <a:prstTxWarp prst="textNoShape">
+              <a:avLst/>
+            </a:prstTxWarp>
+            <a:spAutoFit/>
+          </a:bodyPr>
+          <a:lstStyle/>
+          <a:p>
+            <a:pPr marL="342900" marR="0" indent="-342900" algn="l" defTabSz="914400" rtl="0" eaLnBrk="1" fontAlgn="base" latinLnBrk="0" hangingPunct="1">
+              <a:lnSpc>
+                <a:spcPct val="80000"/>
+              </a:lnSpc>
+              <a:spcBef>
+                <a:spcPct val="20000"/>
+              </a:spcBef>
+              <a:spcAft>
+                <a:spcPct val="0"/>
+              </a:spcAft>
+              <a:buClr>
+                <a:schemeClr val="hlink"/>
+              </a:buClr>
+              <a:buSzPct val="60000"/>
+              <a:buFont typeface="Arial Narrow" pitchFamily="34" charset="0"/>
+              <a:buNone/>
+              <a:tabLst/>
+            </a:pPr>
+            <a:endParaRPr kumimoji="0" lang="en-CA" sz="2000" b="1" i="0" u="none" strike="noStrike" cap="none" normalizeH="0" baseline="0">
+              <a:ln>
+                <a:noFill/>
+              </a:ln>
+              <a:solidFill>
+                <a:schemeClr val="tx1"/>
+              </a:solidFill>
+              <a:effectLst/>
+              <a:latin typeface="Arial" charset="0"/>
+            </a:endParaRPr>
+          </a:p>
+        </p:txBody>
+      </p:sp>
+      <p:pic>
+        <p:nvPicPr>
+          <p:cNvPr id="7" name="Picture 6"/>
+          <p:cNvPicPr>
+            <a:picLocks noChangeAspect="1"/>
+          </p:cNvPicPr>
+          <p:nvPr/>
+        </p:nvPicPr>
+        <p:blipFill>
+          <a:blip r:embed="rId4">
+            <a:clrChange>
+              <a:clrFrom>
+                <a:srgbClr val="FFFFFF"/>
+              </a:clrFrom>
+              <a:clrTo>
+                <a:srgbClr val="FFFFFF">
+                  <a:alpha val="0"/>
+                </a:srgbClr>
+              </a:clrTo>
+            </a:clrChange>
+          </a:blip>
+          <a:stretch>
+            <a:fillRect/>
+          </a:stretch>
+        </p:blipFill>
+        <p:spPr>
+          <a:xfrm>
+            <a:off x="9240736" y="1676870"/>
+            <a:ext cx="2162477" cy="333421"/>
+          </a:xfrm>
+          <a:prstGeom prst="rect">
+            <a:avLst/>
+          </a:prstGeom>
+          <a:ln>
+            <a:noFill/>
+          </a:ln>
+        </p:spPr>
+      </p:pic>
+      <p:sp>
+        <p:nvSpPr>
+          <p:cNvPr id="108" name="TextBox 107"/>
+          <p:cNvSpPr txBox="1"/>
+          <p:nvPr/>
+        </p:nvSpPr>
+        <p:spPr>
+          <a:xfrm>
+            <a:off x="10910309" y="4435570"/>
+            <a:ext cx="585409" cy="369332"/>
+          </a:xfrm>
+          <a:prstGeom prst="rect">
+            <a:avLst/>
+          </a:prstGeom>
+          <a:noFill/>
+        </p:spPr>
+        <p:txBody>
+          <a:bodyPr wrap="square" rtlCol="0">
+            <a:spAutoFit/>
+          </a:bodyPr>
+          <a:lstStyle/>
+          <a:p>
+            <a:r>
+              <a:rPr lang="en-CA" dirty="0"/>
+              <a:t>IaaS</a:t>
+            </a:r>
+          </a:p>
+        </p:txBody>
+      </p:sp>
+      <p:sp>
+        <p:nvSpPr>
+          <p:cNvPr id="33" name="Rectangle 32"/>
+          <p:cNvSpPr/>
+          <p:nvPr/>
+        </p:nvSpPr>
+        <p:spPr bwMode="auto">
+          <a:xfrm>
+            <a:off x="1777348" y="4766239"/>
+            <a:ext cx="925731" cy="386788"/>
+          </a:xfrm>
+          <a:prstGeom prst="rect">
+            <a:avLst/>
+          </a:prstGeom>
+          <a:noFill/>
+          <a:ln w="9525" cap="flat" cmpd="sng" algn="ctr">
+            <a:noFill/>
+            <a:prstDash val="solid"/>
+            <a:round/>
+            <a:headEnd type="none" w="med" len="med"/>
+            <a:tailEnd type="none" w="med" len="med"/>
+          </a:ln>
+          <a:effectLst/>
+        </p:spPr>
+        <p:txBody>
+          <a:bodyPr vert="horz" wrap="square" lIns="91440" tIns="45720" rIns="91440" bIns="45720" numCol="1" rtlCol="0" anchor="t" anchorCtr="0" compatLnSpc="1">
+            <a:prstTxWarp prst="textNoShape">
+              <a:avLst/>
+            </a:prstTxWarp>
+            <a:spAutoFit/>
+          </a:bodyPr>
+          <a:lstStyle/>
+          <a:p>
+            <a:pPr marL="342900" marR="0" indent="-342900" algn="l" defTabSz="914400" rtl="0" eaLnBrk="1" fontAlgn="base" latinLnBrk="0" hangingPunct="1">
+              <a:lnSpc>
+                <a:spcPct val="80000"/>
+              </a:lnSpc>
+              <a:spcBef>
+                <a:spcPct val="20000"/>
+              </a:spcBef>
+              <a:spcAft>
+                <a:spcPct val="0"/>
+              </a:spcAft>
+              <a:buClr>
+                <a:schemeClr val="hlink"/>
+              </a:buClr>
+              <a:buSzPct val="60000"/>
+              <a:buFont typeface="Arial Narrow" pitchFamily="34" charset="0"/>
+              <a:buNone/>
+              <a:tabLst/>
+            </a:pPr>
+            <a:endParaRPr kumimoji="0" lang="en-CA" sz="2000" b="1" i="0" u="none" strike="noStrike" cap="none" normalizeH="0" baseline="0">
+              <a:ln>
+                <a:noFill/>
+              </a:ln>
+              <a:solidFill>
+                <a:schemeClr val="tx1"/>
+              </a:solidFill>
+              <a:effectLst/>
+              <a:latin typeface="Arial" charset="0"/>
+            </a:endParaRPr>
+          </a:p>
+        </p:txBody>
+      </p:sp>
+      <p:cxnSp>
+        <p:nvCxnSpPr>
+          <p:cNvPr id="49" name="Straight Arrow Connector 48"/>
+          <p:cNvCxnSpPr/>
+          <p:nvPr/>
+        </p:nvCxnSpPr>
+        <p:spPr bwMode="auto">
+          <a:xfrm>
+            <a:off x="10014260" y="4262543"/>
+            <a:ext cx="279977" cy="569573"/>
+          </a:xfrm>
+          <a:prstGeom prst="straightConnector1">
+            <a:avLst/>
+          </a:prstGeom>
+          <a:ln>
+            <a:headEnd type="triangle" w="med" len="med"/>
+            <a:tailEnd type="triangle" w="med" len="med"/>
+          </a:ln>
+        </p:spPr>
+        <p:style>
+          <a:lnRef idx="3">
+            <a:schemeClr val="accent5"/>
+          </a:lnRef>
+          <a:fillRef idx="0">
+            <a:schemeClr val="accent5"/>
+          </a:fillRef>
+          <a:effectRef idx="2">
+            <a:schemeClr val="accent5"/>
+          </a:effectRef>
+          <a:fontRef idx="minor">
+            <a:schemeClr val="tx1"/>
+          </a:fontRef>
+        </p:style>
+      </p:cxnSp>
+      <p:cxnSp>
+        <p:nvCxnSpPr>
+          <p:cNvPr id="56" name="Straight Arrow Connector 55"/>
+          <p:cNvCxnSpPr/>
+          <p:nvPr/>
+        </p:nvCxnSpPr>
+        <p:spPr bwMode="auto">
+          <a:xfrm>
+            <a:off x="8308781" y="2150802"/>
+            <a:ext cx="1157336" cy="804873"/>
+          </a:xfrm>
+          <a:prstGeom prst="straightConnector1">
+            <a:avLst/>
+          </a:prstGeom>
+          <a:ln>
+            <a:headEnd type="triangle" w="med" len="med"/>
+            <a:tailEnd type="triangle" w="med" len="med"/>
+          </a:ln>
+        </p:spPr>
+        <p:style>
+          <a:lnRef idx="3">
+            <a:schemeClr val="accent5"/>
+          </a:lnRef>
+          <a:fillRef idx="0">
+            <a:schemeClr val="accent5"/>
+          </a:fillRef>
+          <a:effectRef idx="2">
+            <a:schemeClr val="accent5"/>
+          </a:effectRef>
+          <a:fontRef idx="minor">
+            <a:schemeClr val="tx1"/>
+          </a:fontRef>
+        </p:style>
+      </p:cxnSp>
+      <p:sp>
+        <p:nvSpPr>
+          <p:cNvPr id="73" name="TextBox 72"/>
+          <p:cNvSpPr txBox="1"/>
+          <p:nvPr/>
+        </p:nvSpPr>
+        <p:spPr>
+          <a:xfrm>
+            <a:off x="1037520" y="3204270"/>
+            <a:ext cx="1456617" cy="646331"/>
+          </a:xfrm>
+          <a:prstGeom prst="rect">
+            <a:avLst/>
+          </a:prstGeom>
+          <a:noFill/>
+        </p:spPr>
+        <p:txBody>
+          <a:bodyPr wrap="none" rtlCol="0">
+            <a:spAutoFit/>
+          </a:bodyPr>
+          <a:lstStyle/>
+          <a:p>
+            <a:pPr algn="ctr"/>
+            <a:r>
+              <a:rPr lang="en-CA" dirty="0"/>
+              <a:t>External REST</a:t>
+            </a:r>
+            <a:br>
+              <a:rPr lang="en-CA" dirty="0"/>
+            </a:br>
+            <a:r>
+              <a:rPr lang="en-CA" dirty="0"/>
+              <a:t>Client</a:t>
+            </a:r>
+          </a:p>
+        </p:txBody>
+      </p:sp>
+      <p:pic>
+        <p:nvPicPr>
+          <p:cNvPr id="22" name="Picture 21"/>
+          <p:cNvPicPr>
+            <a:picLocks noChangeAspect="1"/>
+          </p:cNvPicPr>
+          <p:nvPr/>
+        </p:nvPicPr>
+        <p:blipFill>
+          <a:blip r:embed="rId5"/>
+          <a:stretch>
+            <a:fillRect/>
+          </a:stretch>
+        </p:blipFill>
+        <p:spPr>
+          <a:xfrm>
+            <a:off x="9788335" y="4851775"/>
+            <a:ext cx="1257475" cy="1247949"/>
+          </a:xfrm>
+          <a:prstGeom prst="rect">
+            <a:avLst/>
+          </a:prstGeom>
+        </p:spPr>
+      </p:pic>
+      <p:sp>
+        <p:nvSpPr>
+          <p:cNvPr id="77" name="Rectangle 76"/>
+          <p:cNvSpPr/>
+          <p:nvPr/>
+        </p:nvSpPr>
+        <p:spPr bwMode="auto">
+          <a:xfrm>
+            <a:off x="4479241" y="4663578"/>
+            <a:ext cx="4946218" cy="2070498"/>
+          </a:xfrm>
+          <a:prstGeom prst="rect">
+            <a:avLst/>
+          </a:prstGeom>
+          <a:ln>
+            <a:headEnd type="none" w="med" len="med"/>
+            <a:tailEnd type="none" w="med" len="med"/>
+          </a:ln>
+        </p:spPr>
+        <p:style>
+          <a:lnRef idx="1">
+            <a:schemeClr val="accent4"/>
+          </a:lnRef>
+          <a:fillRef idx="2">
+            <a:schemeClr val="accent4"/>
+          </a:fillRef>
+          <a:effectRef idx="1">
+            <a:schemeClr val="accent4"/>
+          </a:effectRef>
+          <a:fontRef idx="minor">
+            <a:schemeClr val="dk1"/>
+          </a:fontRef>
+        </p:style>
+        <p:txBody>
+          <a:bodyPr vert="horz" wrap="square" lIns="91440" tIns="45720" rIns="91440" bIns="45720" numCol="1" rtlCol="0" anchor="b" anchorCtr="0" compatLnSpc="1">
+            <a:prstTxWarp prst="textNoShape">
+              <a:avLst/>
+            </a:prstTxWarp>
+            <a:noAutofit/>
+          </a:bodyPr>
+          <a:lstStyle/>
+          <a:p>
+            <a:pPr marL="342900" marR="0" indent="-342900" algn="ctr" defTabSz="914400" rtl="0" eaLnBrk="1" fontAlgn="base" latinLnBrk="0" hangingPunct="1">
+              <a:lnSpc>
+                <a:spcPct val="80000"/>
+              </a:lnSpc>
+              <a:spcBef>
+                <a:spcPct val="20000"/>
+              </a:spcBef>
+              <a:spcAft>
+                <a:spcPct val="0"/>
+              </a:spcAft>
+              <a:buClr>
+                <a:schemeClr val="hlink"/>
+              </a:buClr>
+              <a:buSzPct val="60000"/>
+              <a:buFont typeface="Arial Narrow" pitchFamily="34" charset="0"/>
+              <a:buNone/>
+              <a:tabLst/>
+            </a:pPr>
+            <a:r>
+              <a:rPr kumimoji="0" lang="en-CA" sz="2000" i="0" u="none" strike="noStrike" cap="none" normalizeH="0" baseline="0" dirty="0">
+                <a:ln>
+                  <a:noFill/>
+                </a:ln>
+                <a:solidFill>
+                  <a:schemeClr val="tx1"/>
+                </a:solidFill>
+                <a:effectLst/>
+                <a:latin typeface="Arial" charset="0"/>
+              </a:rPr>
+              <a:t>Message Router Pool</a:t>
+            </a:r>
+          </a:p>
+        </p:txBody>
+      </p:sp>
+      <p:cxnSp>
+        <p:nvCxnSpPr>
+          <p:cNvPr id="41" name="Straight Arrow Connector 40"/>
+          <p:cNvCxnSpPr>
+            <a:stCxn id="73" idx="2"/>
+          </p:cNvCxnSpPr>
+          <p:nvPr/>
+        </p:nvCxnSpPr>
+        <p:spPr bwMode="auto">
+          <a:xfrm flipH="1">
+            <a:off x="1750826" y="3850601"/>
+            <a:ext cx="15003" cy="944512"/>
+          </a:xfrm>
+          <a:prstGeom prst="straightConnector1">
+            <a:avLst/>
+          </a:prstGeom>
+          <a:ln>
+            <a:solidFill>
+              <a:schemeClr val="tx1"/>
+            </a:solidFill>
+            <a:headEnd type="none" w="med" len="med"/>
+            <a:tailEnd type="triangle" w="med" len="med"/>
+          </a:ln>
+        </p:spPr>
+        <p:style>
+          <a:lnRef idx="3">
+            <a:schemeClr val="accent5"/>
+          </a:lnRef>
+          <a:fillRef idx="0">
+            <a:schemeClr val="accent5"/>
+          </a:fillRef>
+          <a:effectRef idx="2">
+            <a:schemeClr val="accent5"/>
+          </a:effectRef>
+          <a:fontRef idx="minor">
+            <a:schemeClr val="tx1"/>
+          </a:fontRef>
+        </p:style>
+      </p:cxnSp>
+      <p:cxnSp>
+        <p:nvCxnSpPr>
+          <p:cNvPr id="43" name="Straight Arrow Connector 42"/>
+          <p:cNvCxnSpPr/>
+          <p:nvPr/>
+        </p:nvCxnSpPr>
+        <p:spPr bwMode="auto">
+          <a:xfrm flipV="1">
+            <a:off x="1536970" y="3861508"/>
+            <a:ext cx="13461" cy="931710"/>
+          </a:xfrm>
+          <a:prstGeom prst="straightConnector1">
+            <a:avLst/>
+          </a:prstGeom>
+          <a:ln>
+            <a:solidFill>
+              <a:schemeClr val="tx1"/>
+            </a:solidFill>
+            <a:headEnd type="none" w="med" len="med"/>
+            <a:tailEnd type="triangle" w="med" len="med"/>
+          </a:ln>
+        </p:spPr>
+        <p:style>
+          <a:lnRef idx="3">
+            <a:schemeClr val="accent5"/>
+          </a:lnRef>
+          <a:fillRef idx="0">
+            <a:schemeClr val="accent5"/>
+          </a:fillRef>
+          <a:effectRef idx="2">
+            <a:schemeClr val="accent5"/>
+          </a:effectRef>
+          <a:fontRef idx="minor">
+            <a:schemeClr val="tx1"/>
+          </a:fontRef>
+        </p:style>
+      </p:cxnSp>
+      <p:grpSp>
+        <p:nvGrpSpPr>
+          <p:cNvPr id="47" name="Group 46"/>
+          <p:cNvGrpSpPr/>
+          <p:nvPr/>
+        </p:nvGrpSpPr>
+        <p:grpSpPr>
+          <a:xfrm>
+            <a:off x="1186683" y="4994125"/>
+            <a:ext cx="1200150" cy="1205369"/>
+            <a:chOff x="1562100" y="2381249"/>
+            <a:chExt cx="1200150" cy="1205369"/>
+          </a:xfrm>
+        </p:grpSpPr>
+        <p:sp>
+          <p:nvSpPr>
+            <p:cNvPr id="48" name="Rectangle 47"/>
+            <p:cNvSpPr/>
+            <p:nvPr/>
+          </p:nvSpPr>
+          <p:spPr bwMode="auto">
+            <a:xfrm>
+              <a:off x="1562100" y="2381249"/>
+              <a:ext cx="1200150" cy="800102"/>
+            </a:xfrm>
+            <a:prstGeom prst="rect">
+              <a:avLst/>
+            </a:prstGeom>
+            <a:ln>
+              <a:headEnd type="none" w="med" len="med"/>
+              <a:tailEnd type="none" w="med" len="med"/>
+            </a:ln>
+          </p:spPr>
+          <p:style>
+            <a:lnRef idx="0">
+              <a:schemeClr val="accent2"/>
+            </a:lnRef>
+            <a:fillRef idx="3">
+              <a:schemeClr val="accent2"/>
+            </a:fillRef>
+            <a:effectRef idx="3">
+              <a:schemeClr val="accent2"/>
+            </a:effectRef>
+            <a:fontRef idx="minor">
+              <a:schemeClr val="lt1"/>
+            </a:fontRef>
+          </p:style>
+          <p:txBody>
+            <a:bodyPr vert="horz" wrap="square" lIns="91440" tIns="45720" rIns="91440" bIns="45720" numCol="1" rtlCol="0" anchor="ctr" anchorCtr="0" compatLnSpc="1">
+              <a:prstTxWarp prst="textNoShape">
+                <a:avLst/>
+              </a:prstTxWarp>
+              <a:noAutofit/>
+            </a:bodyPr>
+            <a:lstStyle/>
+            <a:p>
+              <a:pPr marL="342900" marR="0" indent="-342900" algn="ctr" defTabSz="914400" rtl="0" eaLnBrk="1" fontAlgn="base" latinLnBrk="0" hangingPunct="1">
+                <a:lnSpc>
+                  <a:spcPct val="80000"/>
+                </a:lnSpc>
+                <a:spcBef>
+                  <a:spcPct val="20000"/>
+                </a:spcBef>
+                <a:spcAft>
+                  <a:spcPct val="0"/>
+                </a:spcAft>
+                <a:buClr>
+                  <a:schemeClr val="hlink"/>
+                </a:buClr>
+                <a:buSzPct val="60000"/>
+                <a:buFont typeface="Arial Narrow" pitchFamily="34" charset="0"/>
+                <a:buNone/>
+                <a:tabLst/>
+              </a:pPr>
+              <a:r>
+                <a:rPr lang="en-CA" sz="2000" dirty="0" err="1" smtClean="0">
+                  <a:solidFill>
+                    <a:schemeClr val="bg1"/>
+                  </a:solidFill>
+                  <a:latin typeface="Arial" charset="0"/>
+                </a:rPr>
+                <a:t>IoT</a:t>
+              </a:r>
+              <a:r>
+                <a:rPr lang="en-CA" sz="2000" dirty="0" smtClean="0">
+                  <a:solidFill>
+                    <a:schemeClr val="bg1"/>
+                  </a:solidFill>
+                  <a:latin typeface="Arial" charset="0"/>
+                </a:rPr>
+                <a:t> Web</a:t>
+              </a:r>
+              <a:endParaRPr kumimoji="0" lang="en-CA" sz="2000" i="0" u="none" strike="noStrike" cap="none" normalizeH="0" baseline="0" dirty="0">
+                <a:ln>
+                  <a:noFill/>
+                </a:ln>
+                <a:solidFill>
+                  <a:schemeClr val="bg1"/>
+                </a:solidFill>
+                <a:effectLst/>
+                <a:latin typeface="Arial" charset="0"/>
+              </a:endParaRPr>
+            </a:p>
+            <a:p>
+              <a:pPr marL="342900" marR="0" indent="-342900" algn="ctr" defTabSz="914400" rtl="0" eaLnBrk="1" fontAlgn="base" latinLnBrk="0" hangingPunct="1">
+                <a:lnSpc>
+                  <a:spcPct val="80000"/>
+                </a:lnSpc>
+                <a:spcBef>
+                  <a:spcPct val="20000"/>
+                </a:spcBef>
+                <a:spcAft>
+                  <a:spcPct val="0"/>
+                </a:spcAft>
+                <a:buClr>
+                  <a:schemeClr val="hlink"/>
+                </a:buClr>
+                <a:buSzPct val="60000"/>
+                <a:buFont typeface="Arial Narrow" pitchFamily="34" charset="0"/>
+                <a:buNone/>
+                <a:tabLst/>
+              </a:pPr>
+              <a:r>
+                <a:rPr lang="en-CA" sz="2000" dirty="0">
+                  <a:solidFill>
+                    <a:schemeClr val="bg1"/>
+                  </a:solidFill>
+                  <a:latin typeface="Arial" charset="0"/>
+                </a:rPr>
+                <a:t>App</a:t>
+              </a:r>
+              <a:endParaRPr kumimoji="0" lang="en-CA" sz="2000" i="0" u="none" strike="noStrike" cap="none" normalizeH="0" baseline="0" dirty="0">
+                <a:ln>
+                  <a:noFill/>
+                </a:ln>
+                <a:solidFill>
+                  <a:schemeClr val="bg1"/>
+                </a:solidFill>
+                <a:effectLst/>
+                <a:latin typeface="Arial" charset="0"/>
+              </a:endParaRPr>
+            </a:p>
+          </p:txBody>
+        </p:sp>
+        <p:grpSp>
+          <p:nvGrpSpPr>
+            <p:cNvPr id="50" name="Group 49"/>
+            <p:cNvGrpSpPr/>
+            <p:nvPr/>
+          </p:nvGrpSpPr>
+          <p:grpSpPr>
+            <a:xfrm>
+              <a:off x="1562100" y="3181351"/>
+              <a:ext cx="1200150" cy="405267"/>
+              <a:chOff x="1562100" y="3181351"/>
+              <a:chExt cx="1200150" cy="405267"/>
+            </a:xfrm>
+          </p:grpSpPr>
+          <p:sp>
+            <p:nvSpPr>
+              <p:cNvPr id="51" name="Rectangle 50"/>
+              <p:cNvSpPr/>
+              <p:nvPr/>
+            </p:nvSpPr>
+            <p:spPr bwMode="auto">
+              <a:xfrm>
+                <a:off x="1562100" y="3181351"/>
+                <a:ext cx="1200150" cy="405267"/>
+              </a:xfrm>
+              <a:prstGeom prst="rect">
+                <a:avLst/>
+              </a:prstGeom>
+              <a:gradFill>
+                <a:gsLst>
+                  <a:gs pos="0">
+                    <a:schemeClr val="accent3">
+                      <a:satMod val="103000"/>
+                      <a:tint val="94000"/>
+                      <a:lumMod val="0"/>
+                      <a:lumOff val="100000"/>
+                    </a:schemeClr>
+                  </a:gs>
+                  <a:gs pos="50000">
+                    <a:schemeClr val="accent3">
+                      <a:satMod val="110000"/>
+                      <a:shade val="100000"/>
+                      <a:lumMod val="12000"/>
+                      <a:lumOff val="88000"/>
+                    </a:schemeClr>
+                  </a:gs>
+                  <a:gs pos="100000">
+                    <a:schemeClr val="accent3">
+                      <a:satMod val="120000"/>
+                      <a:shade val="78000"/>
+                      <a:lumMod val="95000"/>
+                    </a:schemeClr>
+                  </a:gs>
+                </a:gsLst>
+              </a:gradFill>
+              <a:ln>
+                <a:headEnd type="none" w="med" len="med"/>
+                <a:tailEnd type="none" w="med" len="med"/>
+              </a:ln>
+            </p:spPr>
+            <p:style>
+              <a:lnRef idx="0">
+                <a:schemeClr val="accent3"/>
+              </a:lnRef>
+              <a:fillRef idx="3">
+                <a:schemeClr val="accent3"/>
+              </a:fillRef>
+              <a:effectRef idx="3">
+                <a:schemeClr val="accent3"/>
+              </a:effectRef>
+              <a:fontRef idx="minor">
+                <a:schemeClr val="lt1"/>
+              </a:fontRef>
+            </p:style>
+            <p:txBody>
+              <a:bodyPr vert="horz" wrap="square" lIns="91440" tIns="45720" rIns="91440" bIns="45720" numCol="1" rtlCol="0" anchor="ctr" anchorCtr="0" compatLnSpc="1">
+                <a:prstTxWarp prst="textNoShape">
+                  <a:avLst/>
+                </a:prstTxWarp>
+                <a:noAutofit/>
+              </a:bodyPr>
+              <a:lstStyle/>
+              <a:p>
+                <a:pPr marL="342900" marR="0" indent="-342900" algn="ctr" defTabSz="914400" rtl="0" eaLnBrk="1" fontAlgn="base" latinLnBrk="0" hangingPunct="1">
+                  <a:lnSpc>
+                    <a:spcPct val="80000"/>
+                  </a:lnSpc>
+                  <a:spcBef>
+                    <a:spcPct val="20000"/>
+                  </a:spcBef>
+                  <a:spcAft>
+                    <a:spcPct val="0"/>
+                  </a:spcAft>
+                  <a:buClr>
+                    <a:schemeClr val="hlink"/>
+                  </a:buClr>
+                  <a:buSzPct val="60000"/>
+                  <a:buFont typeface="Arial Narrow" pitchFamily="34" charset="0"/>
+                  <a:buNone/>
+                  <a:tabLst/>
+                </a:pPr>
+                <a:endParaRPr kumimoji="0" lang="en-CA" sz="2000" i="0" u="none" strike="noStrike" cap="none" normalizeH="0" baseline="0" dirty="0">
+                  <a:ln>
+                    <a:noFill/>
+                  </a:ln>
+                  <a:solidFill>
+                    <a:schemeClr val="bg1"/>
+                  </a:solidFill>
+                  <a:effectLst/>
+                  <a:latin typeface="Arial" charset="0"/>
+                </a:endParaRPr>
+              </a:p>
+            </p:txBody>
+          </p:sp>
+          <p:pic>
+            <p:nvPicPr>
+              <p:cNvPr id="53" name="Picture 10" descr="http://cdn.springtutorials.com/wp-content/uploads/2015/10/spring-cloud.png"/>
+              <p:cNvPicPr>
+                <a:picLocks noChangeAspect="1" noChangeArrowheads="1"/>
+              </p:cNvPicPr>
+              <p:nvPr/>
+            </p:nvPicPr>
+            <p:blipFill>
+              <a:blip r:embed="rId6" cstate="print">
+                <a:extLst>
+                  <a:ext uri="{28A0092B-C50C-407E-A947-70E740481C1C}">
+                    <a14:useLocalDpi xmlns:a14="http://schemas.microsoft.com/office/drawing/2010/main" val="0"/>
+                  </a:ext>
+                </a:extLst>
+              </a:blip>
+              <a:srcRect/>
+              <a:stretch>
+                <a:fillRect/>
+              </a:stretch>
+            </p:blipFill>
+            <p:spPr bwMode="auto">
+              <a:xfrm>
+                <a:off x="1614487" y="3233737"/>
+                <a:ext cx="447675" cy="300494"/>
+              </a:xfrm>
+              <a:prstGeom prst="rect">
+                <a:avLst/>
+              </a:prstGeom>
+              <a:noFill/>
+              <a:extLst>
+                <a:ext uri="{909E8E84-426E-40DD-AFC4-6F175D3DCCD1}">
+                  <a14:hiddenFill xmlns:a14="http://schemas.microsoft.com/office/drawing/2010/main">
+                    <a:solidFill>
+                      <a:srgbClr val="FFFFFF"/>
+                    </a:solidFill>
+                  </a14:hiddenFill>
+                </a:ext>
+              </a:extLst>
+            </p:spPr>
+          </p:pic>
+          <p:pic>
+            <p:nvPicPr>
+              <p:cNvPr id="57" name="Picture 12" descr="https://spring.io/img/spring-by-pivotal-9066b55828deb3c10e27e609af322c40.png"/>
+              <p:cNvPicPr>
+                <a:picLocks noChangeAspect="1" noChangeArrowheads="1"/>
+              </p:cNvPicPr>
+              <p:nvPr/>
+            </p:nvPicPr>
+            <p:blipFill rotWithShape="1">
+              <a:blip r:embed="rId7" cstate="print">
+                <a:extLst>
+                  <a:ext uri="{28A0092B-C50C-407E-A947-70E740481C1C}">
+                    <a14:useLocalDpi xmlns:a14="http://schemas.microsoft.com/office/drawing/2010/main" val="0"/>
+                  </a:ext>
+                </a:extLst>
+              </a:blip>
+              <a:srcRect l="31148"/>
+              <a:stretch/>
+            </p:blipFill>
+            <p:spPr bwMode="auto">
+              <a:xfrm>
+                <a:off x="2044929" y="3226821"/>
+                <a:ext cx="717321" cy="338596"/>
+              </a:xfrm>
+              <a:prstGeom prst="rect">
+                <a:avLst/>
+              </a:prstGeom>
+              <a:noFill/>
+              <a:extLst>
+                <a:ext uri="{909E8E84-426E-40DD-AFC4-6F175D3DCCD1}">
+                  <a14:hiddenFill xmlns:a14="http://schemas.microsoft.com/office/drawing/2010/main">
+                    <a:solidFill>
+                      <a:srgbClr val="FFFFFF"/>
+                    </a:solidFill>
+                  </a14:hiddenFill>
+                </a:ext>
+              </a:extLst>
+            </p:spPr>
+          </p:pic>
+        </p:grpSp>
+      </p:grpSp>
+      <p:pic>
+        <p:nvPicPr>
+          <p:cNvPr id="111" name="Picture 2"/>
+          <p:cNvPicPr>
+            <a:picLocks noChangeAspect="1" noChangeArrowheads="1"/>
+          </p:cNvPicPr>
+          <p:nvPr/>
+        </p:nvPicPr>
+        <p:blipFill>
+          <a:blip r:embed="rId8">
+            <a:extLst>
+              <a:ext uri="{28A0092B-C50C-407E-A947-70E740481C1C}">
+                <a14:useLocalDpi xmlns:a14="http://schemas.microsoft.com/office/drawing/2010/main" val="0"/>
+              </a:ext>
+            </a:extLst>
+          </a:blip>
+          <a:srcRect/>
+          <a:stretch>
+            <a:fillRect/>
+          </a:stretch>
+        </p:blipFill>
+        <p:spPr bwMode="auto">
+          <a:xfrm>
+            <a:off x="5669592" y="4793218"/>
+            <a:ext cx="1629648" cy="1629648"/>
+          </a:xfrm>
+          <a:prstGeom prst="rect">
+            <a:avLst/>
+          </a:prstGeom>
+          <a:noFill/>
+          <a:ln>
+            <a:noFill/>
+          </a:ln>
+          <a:effectLst/>
+          <a:extLst>
+            <a:ext uri="{909E8E84-426E-40DD-AFC4-6F175D3DCCD1}">
+              <a14:hiddenFill xmlns:a14="http://schemas.microsoft.com/office/drawing/2010/main">
+                <a:solidFill>
+                  <a:schemeClr val="accent1"/>
+                </a:solidFill>
+              </a14:hiddenFill>
+            </a:ext>
+            <a:ext uri="{91240B29-F687-4F45-9708-019B960494DF}">
+              <a14:hiddenLine xmlns:a14="http://schemas.microsoft.com/office/drawing/2010/main" w="9525">
+                <a:solidFill>
+                  <a:schemeClr val="tx1"/>
+                </a:solidFill>
+                <a:miter lim="800000"/>
+                <a:headEnd/>
+                <a:tailEnd/>
+              </a14:hiddenLine>
+            </a:ext>
+            <a:ext uri="{AF507438-7753-43E0-B8FC-AC1667EBCBE1}">
+              <a14:hiddenEffects xmlns:a14="http://schemas.microsoft.com/office/drawing/2010/main">
+                <a:effectLst>
+                  <a:outerShdw dist="35921" dir="2700000" algn="ctr" rotWithShape="0">
+                    <a:schemeClr val="bg2"/>
+                  </a:outerShdw>
+                </a:effectLst>
+              </a14:hiddenEffects>
+            </a:ext>
+          </a:extLst>
+        </p:spPr>
+      </p:pic>
+      <p:pic>
+        <p:nvPicPr>
+          <p:cNvPr id="112" name="Picture 2"/>
+          <p:cNvPicPr>
+            <a:picLocks noChangeAspect="1" noChangeArrowheads="1"/>
+          </p:cNvPicPr>
+          <p:nvPr/>
+        </p:nvPicPr>
+        <p:blipFill>
+          <a:blip r:embed="rId9" cstate="print">
+            <a:extLst>
+              <a:ext uri="{28A0092B-C50C-407E-A947-70E740481C1C}">
+                <a14:useLocalDpi xmlns:a14="http://schemas.microsoft.com/office/drawing/2010/main" val="0"/>
+              </a:ext>
+            </a:extLst>
+          </a:blip>
+          <a:srcRect/>
+          <a:stretch>
+            <a:fillRect/>
+          </a:stretch>
+        </p:blipFill>
+        <p:spPr bwMode="auto">
+          <a:xfrm>
+            <a:off x="8360231" y="5048483"/>
+            <a:ext cx="701278" cy="701278"/>
+          </a:xfrm>
+          <a:prstGeom prst="rect">
+            <a:avLst/>
+          </a:prstGeom>
+          <a:noFill/>
+          <a:ln>
+            <a:noFill/>
+          </a:ln>
+          <a:effectLst/>
+          <a:extLst>
+            <a:ext uri="{909E8E84-426E-40DD-AFC4-6F175D3DCCD1}">
+              <a14:hiddenFill xmlns:a14="http://schemas.microsoft.com/office/drawing/2010/main">
+                <a:solidFill>
+                  <a:schemeClr val="accent1"/>
+                </a:solidFill>
+              </a14:hiddenFill>
+            </a:ext>
+            <a:ext uri="{91240B29-F687-4F45-9708-019B960494DF}">
+              <a14:hiddenLine xmlns:a14="http://schemas.microsoft.com/office/drawing/2010/main" w="9525">
+                <a:solidFill>
+                  <a:schemeClr val="tx1"/>
+                </a:solidFill>
+                <a:miter lim="800000"/>
+                <a:headEnd/>
+                <a:tailEnd/>
+              </a14:hiddenLine>
+            </a:ext>
+            <a:ext uri="{AF507438-7753-43E0-B8FC-AC1667EBCBE1}">
+              <a14:hiddenEffects xmlns:a14="http://schemas.microsoft.com/office/drawing/2010/main">
+                <a:effectLst>
+                  <a:outerShdw dist="35921" dir="2700000" algn="ctr" rotWithShape="0">
+                    <a:schemeClr val="bg2"/>
+                  </a:outerShdw>
+                </a:effectLst>
+              </a14:hiddenEffects>
+            </a:ext>
+          </a:extLst>
+        </p:spPr>
+      </p:pic>
+      <p:pic>
+        <p:nvPicPr>
+          <p:cNvPr id="113" name="Picture 2"/>
+          <p:cNvPicPr>
+            <a:picLocks noChangeAspect="1" noChangeArrowheads="1"/>
+          </p:cNvPicPr>
+          <p:nvPr/>
+        </p:nvPicPr>
+        <p:blipFill>
+          <a:blip r:embed="rId9" cstate="print">
+            <a:extLst>
+              <a:ext uri="{28A0092B-C50C-407E-A947-70E740481C1C}">
+                <a14:useLocalDpi xmlns:a14="http://schemas.microsoft.com/office/drawing/2010/main" val="0"/>
+              </a:ext>
+            </a:extLst>
+          </a:blip>
+          <a:srcRect/>
+          <a:stretch>
+            <a:fillRect/>
+          </a:stretch>
+        </p:blipFill>
+        <p:spPr bwMode="auto">
+          <a:xfrm>
+            <a:off x="8512631" y="5200883"/>
+            <a:ext cx="701278" cy="701278"/>
+          </a:xfrm>
+          <a:prstGeom prst="rect">
+            <a:avLst/>
+          </a:prstGeom>
+          <a:noFill/>
+          <a:ln>
+            <a:noFill/>
+          </a:ln>
+          <a:effectLst/>
+          <a:extLst>
+            <a:ext uri="{909E8E84-426E-40DD-AFC4-6F175D3DCCD1}">
+              <a14:hiddenFill xmlns:a14="http://schemas.microsoft.com/office/drawing/2010/main">
+                <a:solidFill>
+                  <a:schemeClr val="accent1"/>
+                </a:solidFill>
+              </a14:hiddenFill>
+            </a:ext>
+            <a:ext uri="{91240B29-F687-4F45-9708-019B960494DF}">
+              <a14:hiddenLine xmlns:a14="http://schemas.microsoft.com/office/drawing/2010/main" w="9525">
+                <a:solidFill>
+                  <a:schemeClr val="tx1"/>
+                </a:solidFill>
+                <a:miter lim="800000"/>
+                <a:headEnd/>
+                <a:tailEnd/>
+              </a14:hiddenLine>
+            </a:ext>
+            <a:ext uri="{AF507438-7753-43E0-B8FC-AC1667EBCBE1}">
+              <a14:hiddenEffects xmlns:a14="http://schemas.microsoft.com/office/drawing/2010/main">
+                <a:effectLst>
+                  <a:outerShdw dist="35921" dir="2700000" algn="ctr" rotWithShape="0">
+                    <a:schemeClr val="bg2"/>
+                  </a:outerShdw>
+                </a:effectLst>
+              </a14:hiddenEffects>
+            </a:ext>
+          </a:extLst>
+        </p:spPr>
+      </p:pic>
+      <p:cxnSp>
+        <p:nvCxnSpPr>
+          <p:cNvPr id="58" name="Straight Arrow Connector 57"/>
+          <p:cNvCxnSpPr/>
+          <p:nvPr/>
+        </p:nvCxnSpPr>
+        <p:spPr bwMode="auto">
+          <a:xfrm flipH="1" flipV="1">
+            <a:off x="2479938" y="5794227"/>
+            <a:ext cx="1999303" cy="24211"/>
+          </a:xfrm>
+          <a:prstGeom prst="straightConnector1">
+            <a:avLst/>
+          </a:prstGeom>
+          <a:ln>
+            <a:headEnd type="none" w="med" len="med"/>
+            <a:tailEnd type="arrow"/>
+          </a:ln>
+        </p:spPr>
+        <p:style>
+          <a:lnRef idx="3">
+            <a:schemeClr val="accent1"/>
+          </a:lnRef>
+          <a:fillRef idx="0">
+            <a:schemeClr val="accent1"/>
+          </a:fillRef>
+          <a:effectRef idx="2">
+            <a:schemeClr val="accent1"/>
+          </a:effectRef>
+          <a:fontRef idx="minor">
+            <a:schemeClr val="tx1"/>
+          </a:fontRef>
+        </p:style>
+      </p:cxnSp>
+      <p:sp>
+        <p:nvSpPr>
+          <p:cNvPr id="61" name="Flowchart: Document 60"/>
+          <p:cNvSpPr/>
+          <p:nvPr/>
+        </p:nvSpPr>
+        <p:spPr bwMode="auto">
+          <a:xfrm>
+            <a:off x="4141904" y="5717173"/>
+            <a:ext cx="82703" cy="202530"/>
+          </a:xfrm>
+          <a:prstGeom prst="flowChartDocument">
+            <a:avLst/>
+          </a:prstGeom>
+          <a:solidFill>
+            <a:srgbClr val="F79646"/>
+          </a:solidFill>
+          <a:ln>
+            <a:headEnd type="none" w="med" len="med"/>
+            <a:tailEnd type="none" w="med" len="med"/>
+          </a:ln>
+        </p:spPr>
+        <p:style>
+          <a:lnRef idx="0">
+            <a:schemeClr val="accent1"/>
+          </a:lnRef>
+          <a:fillRef idx="3">
+            <a:schemeClr val="accent1"/>
+          </a:fillRef>
+          <a:effectRef idx="3">
+            <a:schemeClr val="accent1"/>
+          </a:effectRef>
+          <a:fontRef idx="minor">
+            <a:schemeClr val="lt1"/>
+          </a:fontRef>
+        </p:style>
+        <p:txBody>
+          <a:bodyPr/>
+          <a:lstStyle>
+            <a:defPPr>
+              <a:defRPr lang="en-US"/>
+            </a:defPPr>
+            <a:lvl1pPr algn="l" rtl="0" fontAlgn="base">
+              <a:spcBef>
+                <a:spcPct val="20000"/>
+              </a:spcBef>
+              <a:spcAft>
+                <a:spcPct val="0"/>
+              </a:spcAft>
+              <a:buSzPct val="100000"/>
+              <a:buFont typeface="Arial" charset="0"/>
+              <a:buChar char="•"/>
+              <a:defRPr kern="1200">
+                <a:solidFill>
+                  <a:schemeClr val="dk1"/>
+                </a:solidFill>
+                <a:latin typeface="+mn-lt"/>
+                <a:ea typeface="+mn-ea"/>
+                <a:cs typeface="+mn-cs"/>
+              </a:defRPr>
+            </a:lvl1pPr>
+            <a:lvl2pPr marL="457200" algn="l" rtl="0" fontAlgn="base">
+              <a:spcBef>
+                <a:spcPct val="20000"/>
+              </a:spcBef>
+              <a:spcAft>
+                <a:spcPct val="0"/>
+              </a:spcAft>
+              <a:buSzPct val="100000"/>
+              <a:buFont typeface="Arial" charset="0"/>
+              <a:buChar char="•"/>
+              <a:defRPr kern="1200">
+                <a:solidFill>
+                  <a:schemeClr val="dk1"/>
+                </a:solidFill>
+                <a:latin typeface="+mn-lt"/>
+                <a:ea typeface="+mn-ea"/>
+                <a:cs typeface="+mn-cs"/>
+              </a:defRPr>
+            </a:lvl2pPr>
+            <a:lvl3pPr marL="914400" algn="l" rtl="0" fontAlgn="base">
+              <a:spcBef>
+                <a:spcPct val="20000"/>
+              </a:spcBef>
+              <a:spcAft>
+                <a:spcPct val="0"/>
+              </a:spcAft>
+              <a:buSzPct val="100000"/>
+              <a:buFont typeface="Arial" charset="0"/>
+              <a:buChar char="•"/>
+              <a:defRPr kern="1200">
+                <a:solidFill>
+                  <a:schemeClr val="dk1"/>
+                </a:solidFill>
+                <a:latin typeface="+mn-lt"/>
+                <a:ea typeface="+mn-ea"/>
+                <a:cs typeface="+mn-cs"/>
+              </a:defRPr>
+            </a:lvl3pPr>
+            <a:lvl4pPr marL="1371600" algn="l" rtl="0" fontAlgn="base">
+              <a:spcBef>
+                <a:spcPct val="20000"/>
+              </a:spcBef>
+              <a:spcAft>
+                <a:spcPct val="0"/>
+              </a:spcAft>
+              <a:buSzPct val="100000"/>
+              <a:buFont typeface="Arial" charset="0"/>
+              <a:buChar char="•"/>
+              <a:defRPr kern="1200">
+                <a:solidFill>
+                  <a:schemeClr val="dk1"/>
+                </a:solidFill>
+                <a:latin typeface="+mn-lt"/>
+                <a:ea typeface="+mn-ea"/>
+                <a:cs typeface="+mn-cs"/>
+              </a:defRPr>
+            </a:lvl4pPr>
+            <a:lvl5pPr marL="1828800" algn="l" rtl="0" fontAlgn="base">
+              <a:spcBef>
+                <a:spcPct val="20000"/>
+              </a:spcBef>
+              <a:spcAft>
+                <a:spcPct val="0"/>
+              </a:spcAft>
+              <a:buSzPct val="100000"/>
+              <a:buFont typeface="Arial" charset="0"/>
+              <a:buChar char="•"/>
+              <a:defRPr kern="1200">
+                <a:solidFill>
+                  <a:schemeClr val="dk1"/>
+                </a:solidFill>
+                <a:latin typeface="+mn-lt"/>
+                <a:ea typeface="+mn-ea"/>
+                <a:cs typeface="+mn-cs"/>
+              </a:defRPr>
+            </a:lvl5pPr>
+            <a:lvl6pPr marL="2286000" algn="l" defTabSz="914400" rtl="0" eaLnBrk="1" latinLnBrk="0" hangingPunct="1">
+              <a:defRPr kern="1200">
+                <a:solidFill>
+                  <a:schemeClr val="dk1"/>
+                </a:solidFill>
+                <a:latin typeface="+mn-lt"/>
+                <a:ea typeface="+mn-ea"/>
+                <a:cs typeface="+mn-cs"/>
+              </a:defRPr>
+            </a:lvl6pPr>
+            <a:lvl7pPr marL="2743200" algn="l" defTabSz="914400" rtl="0" eaLnBrk="1" latinLnBrk="0" hangingPunct="1">
+              <a:defRPr kern="1200">
+                <a:solidFill>
+                  <a:schemeClr val="dk1"/>
+                </a:solidFill>
+                <a:latin typeface="+mn-lt"/>
+                <a:ea typeface="+mn-ea"/>
+                <a:cs typeface="+mn-cs"/>
+              </a:defRPr>
+            </a:lvl7pPr>
+            <a:lvl8pPr marL="3200400" algn="l" defTabSz="914400" rtl="0" eaLnBrk="1" latinLnBrk="0" hangingPunct="1">
+              <a:defRPr kern="1200">
+                <a:solidFill>
+                  <a:schemeClr val="dk1"/>
+                </a:solidFill>
+                <a:latin typeface="+mn-lt"/>
+                <a:ea typeface="+mn-ea"/>
+                <a:cs typeface="+mn-cs"/>
+              </a:defRPr>
+            </a:lvl8pPr>
+            <a:lvl9pPr marL="3657600" algn="l" defTabSz="914400" rtl="0" eaLnBrk="1" latinLnBrk="0" hangingPunct="1">
+              <a:defRPr kern="1200">
+                <a:solidFill>
+                  <a:schemeClr val="dk1"/>
+                </a:solidFill>
+                <a:latin typeface="+mn-lt"/>
+                <a:ea typeface="+mn-ea"/>
+                <a:cs typeface="+mn-cs"/>
+              </a:defRPr>
+            </a:lvl9pPr>
+          </a:lstStyle>
+          <a:p>
+            <a:pPr>
+              <a:defRPr/>
+            </a:pPr>
+            <a:endParaRPr lang="en-US">
+              <a:solidFill>
+                <a:srgbClr val="000000"/>
+              </a:solidFill>
+            </a:endParaRPr>
+          </a:p>
+        </p:txBody>
+      </p:sp>
+      <p:sp>
+        <p:nvSpPr>
+          <p:cNvPr id="65" name="Flowchart: Document 64"/>
+          <p:cNvSpPr/>
+          <p:nvPr/>
+        </p:nvSpPr>
+        <p:spPr bwMode="auto">
+          <a:xfrm>
+            <a:off x="3456086" y="5728268"/>
+            <a:ext cx="81012" cy="202530"/>
+          </a:xfrm>
+          <a:prstGeom prst="flowChartDocument">
+            <a:avLst/>
+          </a:prstGeom>
+          <a:solidFill>
+            <a:srgbClr val="F79646"/>
+          </a:solidFill>
+          <a:ln>
+            <a:headEnd type="none" w="med" len="med"/>
+            <a:tailEnd type="none" w="med" len="med"/>
+          </a:ln>
+        </p:spPr>
+        <p:style>
+          <a:lnRef idx="0">
+            <a:schemeClr val="accent1"/>
+          </a:lnRef>
+          <a:fillRef idx="3">
+            <a:schemeClr val="accent1"/>
+          </a:fillRef>
+          <a:effectRef idx="3">
+            <a:schemeClr val="accent1"/>
+          </a:effectRef>
+          <a:fontRef idx="minor">
+            <a:schemeClr val="lt1"/>
+          </a:fontRef>
+        </p:style>
+        <p:txBody>
+          <a:bodyPr/>
+          <a:lstStyle>
+            <a:defPPr>
+              <a:defRPr lang="en-US"/>
+            </a:defPPr>
+            <a:lvl1pPr algn="l" rtl="0" fontAlgn="base">
+              <a:spcBef>
+                <a:spcPct val="20000"/>
+              </a:spcBef>
+              <a:spcAft>
+                <a:spcPct val="0"/>
+              </a:spcAft>
+              <a:buSzPct val="100000"/>
+              <a:buFont typeface="Arial" charset="0"/>
+              <a:buChar char="•"/>
+              <a:defRPr kern="1200">
+                <a:solidFill>
+                  <a:schemeClr val="dk1"/>
+                </a:solidFill>
+                <a:latin typeface="+mn-lt"/>
+                <a:ea typeface="+mn-ea"/>
+                <a:cs typeface="+mn-cs"/>
+              </a:defRPr>
+            </a:lvl1pPr>
+            <a:lvl2pPr marL="457200" algn="l" rtl="0" fontAlgn="base">
+              <a:spcBef>
+                <a:spcPct val="20000"/>
+              </a:spcBef>
+              <a:spcAft>
+                <a:spcPct val="0"/>
+              </a:spcAft>
+              <a:buSzPct val="100000"/>
+              <a:buFont typeface="Arial" charset="0"/>
+              <a:buChar char="•"/>
+              <a:defRPr kern="1200">
+                <a:solidFill>
+                  <a:schemeClr val="dk1"/>
+                </a:solidFill>
+                <a:latin typeface="+mn-lt"/>
+                <a:ea typeface="+mn-ea"/>
+                <a:cs typeface="+mn-cs"/>
+              </a:defRPr>
+            </a:lvl2pPr>
+            <a:lvl3pPr marL="914400" algn="l" rtl="0" fontAlgn="base">
+              <a:spcBef>
+                <a:spcPct val="20000"/>
+              </a:spcBef>
+              <a:spcAft>
+                <a:spcPct val="0"/>
+              </a:spcAft>
+              <a:buSzPct val="100000"/>
+              <a:buFont typeface="Arial" charset="0"/>
+              <a:buChar char="•"/>
+              <a:defRPr kern="1200">
+                <a:solidFill>
+                  <a:schemeClr val="dk1"/>
+                </a:solidFill>
+                <a:latin typeface="+mn-lt"/>
+                <a:ea typeface="+mn-ea"/>
+                <a:cs typeface="+mn-cs"/>
+              </a:defRPr>
+            </a:lvl3pPr>
+            <a:lvl4pPr marL="1371600" algn="l" rtl="0" fontAlgn="base">
+              <a:spcBef>
+                <a:spcPct val="20000"/>
+              </a:spcBef>
+              <a:spcAft>
+                <a:spcPct val="0"/>
+              </a:spcAft>
+              <a:buSzPct val="100000"/>
+              <a:buFont typeface="Arial" charset="0"/>
+              <a:buChar char="•"/>
+              <a:defRPr kern="1200">
+                <a:solidFill>
+                  <a:schemeClr val="dk1"/>
+                </a:solidFill>
+                <a:latin typeface="+mn-lt"/>
+                <a:ea typeface="+mn-ea"/>
+                <a:cs typeface="+mn-cs"/>
+              </a:defRPr>
+            </a:lvl4pPr>
+            <a:lvl5pPr marL="1828800" algn="l" rtl="0" fontAlgn="base">
+              <a:spcBef>
+                <a:spcPct val="20000"/>
+              </a:spcBef>
+              <a:spcAft>
+                <a:spcPct val="0"/>
+              </a:spcAft>
+              <a:buSzPct val="100000"/>
+              <a:buFont typeface="Arial" charset="0"/>
+              <a:buChar char="•"/>
+              <a:defRPr kern="1200">
+                <a:solidFill>
+                  <a:schemeClr val="dk1"/>
+                </a:solidFill>
+                <a:latin typeface="+mn-lt"/>
+                <a:ea typeface="+mn-ea"/>
+                <a:cs typeface="+mn-cs"/>
+              </a:defRPr>
+            </a:lvl5pPr>
+            <a:lvl6pPr marL="2286000" algn="l" defTabSz="914400" rtl="0" eaLnBrk="1" latinLnBrk="0" hangingPunct="1">
+              <a:defRPr kern="1200">
+                <a:solidFill>
+                  <a:schemeClr val="dk1"/>
+                </a:solidFill>
+                <a:latin typeface="+mn-lt"/>
+                <a:ea typeface="+mn-ea"/>
+                <a:cs typeface="+mn-cs"/>
+              </a:defRPr>
+            </a:lvl6pPr>
+            <a:lvl7pPr marL="2743200" algn="l" defTabSz="914400" rtl="0" eaLnBrk="1" latinLnBrk="0" hangingPunct="1">
+              <a:defRPr kern="1200">
+                <a:solidFill>
+                  <a:schemeClr val="dk1"/>
+                </a:solidFill>
+                <a:latin typeface="+mn-lt"/>
+                <a:ea typeface="+mn-ea"/>
+                <a:cs typeface="+mn-cs"/>
+              </a:defRPr>
+            </a:lvl7pPr>
+            <a:lvl8pPr marL="3200400" algn="l" defTabSz="914400" rtl="0" eaLnBrk="1" latinLnBrk="0" hangingPunct="1">
+              <a:defRPr kern="1200">
+                <a:solidFill>
+                  <a:schemeClr val="dk1"/>
+                </a:solidFill>
+                <a:latin typeface="+mn-lt"/>
+                <a:ea typeface="+mn-ea"/>
+                <a:cs typeface="+mn-cs"/>
+              </a:defRPr>
+            </a:lvl8pPr>
+            <a:lvl9pPr marL="3657600" algn="l" defTabSz="914400" rtl="0" eaLnBrk="1" latinLnBrk="0" hangingPunct="1">
+              <a:defRPr kern="1200">
+                <a:solidFill>
+                  <a:schemeClr val="dk1"/>
+                </a:solidFill>
+                <a:latin typeface="+mn-lt"/>
+                <a:ea typeface="+mn-ea"/>
+                <a:cs typeface="+mn-cs"/>
+              </a:defRPr>
+            </a:lvl9pPr>
+          </a:lstStyle>
+          <a:p>
+            <a:pPr>
+              <a:defRPr/>
+            </a:pPr>
+            <a:endParaRPr lang="en-US">
+              <a:solidFill>
+                <a:srgbClr val="000000"/>
+              </a:solidFill>
+            </a:endParaRPr>
+          </a:p>
+        </p:txBody>
+      </p:sp>
+      <p:sp>
+        <p:nvSpPr>
+          <p:cNvPr id="66" name="Flowchart: Document 65"/>
+          <p:cNvSpPr/>
+          <p:nvPr/>
+        </p:nvSpPr>
+        <p:spPr bwMode="auto">
+          <a:xfrm>
+            <a:off x="2849391" y="5707425"/>
+            <a:ext cx="81012" cy="202530"/>
+          </a:xfrm>
+          <a:prstGeom prst="flowChartDocument">
+            <a:avLst/>
+          </a:prstGeom>
+          <a:solidFill>
+            <a:srgbClr val="F79646"/>
+          </a:solidFill>
+          <a:ln>
+            <a:headEnd type="none" w="med" len="med"/>
+            <a:tailEnd type="none" w="med" len="med"/>
+          </a:ln>
+        </p:spPr>
+        <p:style>
+          <a:lnRef idx="0">
+            <a:schemeClr val="accent1"/>
+          </a:lnRef>
+          <a:fillRef idx="3">
+            <a:schemeClr val="accent1"/>
+          </a:fillRef>
+          <a:effectRef idx="3">
+            <a:schemeClr val="accent1"/>
+          </a:effectRef>
+          <a:fontRef idx="minor">
+            <a:schemeClr val="lt1"/>
+          </a:fontRef>
+        </p:style>
+        <p:txBody>
+          <a:bodyPr/>
+          <a:lstStyle>
+            <a:defPPr>
+              <a:defRPr lang="en-US"/>
+            </a:defPPr>
+            <a:lvl1pPr algn="l" rtl="0" fontAlgn="base">
+              <a:spcBef>
+                <a:spcPct val="20000"/>
+              </a:spcBef>
+              <a:spcAft>
+                <a:spcPct val="0"/>
+              </a:spcAft>
+              <a:buSzPct val="100000"/>
+              <a:buFont typeface="Arial" charset="0"/>
+              <a:buChar char="•"/>
+              <a:defRPr kern="1200">
+                <a:solidFill>
+                  <a:schemeClr val="dk1"/>
+                </a:solidFill>
+                <a:latin typeface="+mn-lt"/>
+                <a:ea typeface="+mn-ea"/>
+                <a:cs typeface="+mn-cs"/>
+              </a:defRPr>
+            </a:lvl1pPr>
+            <a:lvl2pPr marL="457200" algn="l" rtl="0" fontAlgn="base">
+              <a:spcBef>
+                <a:spcPct val="20000"/>
+              </a:spcBef>
+              <a:spcAft>
+                <a:spcPct val="0"/>
+              </a:spcAft>
+              <a:buSzPct val="100000"/>
+              <a:buFont typeface="Arial" charset="0"/>
+              <a:buChar char="•"/>
+              <a:defRPr kern="1200">
+                <a:solidFill>
+                  <a:schemeClr val="dk1"/>
+                </a:solidFill>
+                <a:latin typeface="+mn-lt"/>
+                <a:ea typeface="+mn-ea"/>
+                <a:cs typeface="+mn-cs"/>
+              </a:defRPr>
+            </a:lvl2pPr>
+            <a:lvl3pPr marL="914400" algn="l" rtl="0" fontAlgn="base">
+              <a:spcBef>
+                <a:spcPct val="20000"/>
+              </a:spcBef>
+              <a:spcAft>
+                <a:spcPct val="0"/>
+              </a:spcAft>
+              <a:buSzPct val="100000"/>
+              <a:buFont typeface="Arial" charset="0"/>
+              <a:buChar char="•"/>
+              <a:defRPr kern="1200">
+                <a:solidFill>
+                  <a:schemeClr val="dk1"/>
+                </a:solidFill>
+                <a:latin typeface="+mn-lt"/>
+                <a:ea typeface="+mn-ea"/>
+                <a:cs typeface="+mn-cs"/>
+              </a:defRPr>
+            </a:lvl3pPr>
+            <a:lvl4pPr marL="1371600" algn="l" rtl="0" fontAlgn="base">
+              <a:spcBef>
+                <a:spcPct val="20000"/>
+              </a:spcBef>
+              <a:spcAft>
+                <a:spcPct val="0"/>
+              </a:spcAft>
+              <a:buSzPct val="100000"/>
+              <a:buFont typeface="Arial" charset="0"/>
+              <a:buChar char="•"/>
+              <a:defRPr kern="1200">
+                <a:solidFill>
+                  <a:schemeClr val="dk1"/>
+                </a:solidFill>
+                <a:latin typeface="+mn-lt"/>
+                <a:ea typeface="+mn-ea"/>
+                <a:cs typeface="+mn-cs"/>
+              </a:defRPr>
+            </a:lvl4pPr>
+            <a:lvl5pPr marL="1828800" algn="l" rtl="0" fontAlgn="base">
+              <a:spcBef>
+                <a:spcPct val="20000"/>
+              </a:spcBef>
+              <a:spcAft>
+                <a:spcPct val="0"/>
+              </a:spcAft>
+              <a:buSzPct val="100000"/>
+              <a:buFont typeface="Arial" charset="0"/>
+              <a:buChar char="•"/>
+              <a:defRPr kern="1200">
+                <a:solidFill>
+                  <a:schemeClr val="dk1"/>
+                </a:solidFill>
+                <a:latin typeface="+mn-lt"/>
+                <a:ea typeface="+mn-ea"/>
+                <a:cs typeface="+mn-cs"/>
+              </a:defRPr>
+            </a:lvl5pPr>
+            <a:lvl6pPr marL="2286000" algn="l" defTabSz="914400" rtl="0" eaLnBrk="1" latinLnBrk="0" hangingPunct="1">
+              <a:defRPr kern="1200">
+                <a:solidFill>
+                  <a:schemeClr val="dk1"/>
+                </a:solidFill>
+                <a:latin typeface="+mn-lt"/>
+                <a:ea typeface="+mn-ea"/>
+                <a:cs typeface="+mn-cs"/>
+              </a:defRPr>
+            </a:lvl6pPr>
+            <a:lvl7pPr marL="2743200" algn="l" defTabSz="914400" rtl="0" eaLnBrk="1" latinLnBrk="0" hangingPunct="1">
+              <a:defRPr kern="1200">
+                <a:solidFill>
+                  <a:schemeClr val="dk1"/>
+                </a:solidFill>
+                <a:latin typeface="+mn-lt"/>
+                <a:ea typeface="+mn-ea"/>
+                <a:cs typeface="+mn-cs"/>
+              </a:defRPr>
+            </a:lvl7pPr>
+            <a:lvl8pPr marL="3200400" algn="l" defTabSz="914400" rtl="0" eaLnBrk="1" latinLnBrk="0" hangingPunct="1">
+              <a:defRPr kern="1200">
+                <a:solidFill>
+                  <a:schemeClr val="dk1"/>
+                </a:solidFill>
+                <a:latin typeface="+mn-lt"/>
+                <a:ea typeface="+mn-ea"/>
+                <a:cs typeface="+mn-cs"/>
+              </a:defRPr>
+            </a:lvl8pPr>
+            <a:lvl9pPr marL="3657600" algn="l" defTabSz="914400" rtl="0" eaLnBrk="1" latinLnBrk="0" hangingPunct="1">
+              <a:defRPr kern="1200">
+                <a:solidFill>
+                  <a:schemeClr val="dk1"/>
+                </a:solidFill>
+                <a:latin typeface="+mn-lt"/>
+                <a:ea typeface="+mn-ea"/>
+                <a:cs typeface="+mn-cs"/>
+              </a:defRPr>
+            </a:lvl9pPr>
+          </a:lstStyle>
+          <a:p>
+            <a:pPr>
+              <a:defRPr/>
+            </a:pPr>
+            <a:endParaRPr lang="en-US">
+              <a:solidFill>
+                <a:srgbClr val="000000"/>
+              </a:solidFill>
+            </a:endParaRPr>
+          </a:p>
+        </p:txBody>
+      </p:sp>
+      <p:cxnSp>
+        <p:nvCxnSpPr>
+          <p:cNvPr id="67" name="Straight Arrow Connector 66"/>
+          <p:cNvCxnSpPr/>
+          <p:nvPr/>
+        </p:nvCxnSpPr>
+        <p:spPr bwMode="auto">
+          <a:xfrm>
+            <a:off x="2497913" y="5536446"/>
+            <a:ext cx="1958288" cy="20089"/>
+          </a:xfrm>
+          <a:prstGeom prst="straightConnector1">
+            <a:avLst/>
+          </a:prstGeom>
+          <a:ln>
+            <a:headEnd type="none" w="med" len="med"/>
+            <a:tailEnd type="arrow"/>
+          </a:ln>
+        </p:spPr>
+        <p:style>
+          <a:lnRef idx="3">
+            <a:schemeClr val="accent1"/>
+          </a:lnRef>
+          <a:fillRef idx="0">
+            <a:schemeClr val="accent1"/>
+          </a:fillRef>
+          <a:effectRef idx="2">
+            <a:schemeClr val="accent1"/>
+          </a:effectRef>
+          <a:fontRef idx="minor">
+            <a:schemeClr val="tx1"/>
+          </a:fontRef>
+        </p:style>
+      </p:cxnSp>
+      <p:sp>
+        <p:nvSpPr>
+          <p:cNvPr id="70" name="Flowchart: Document 69"/>
+          <p:cNvSpPr/>
+          <p:nvPr/>
+        </p:nvSpPr>
+        <p:spPr bwMode="auto">
+          <a:xfrm>
+            <a:off x="4005142" y="5461546"/>
+            <a:ext cx="81012" cy="202530"/>
+          </a:xfrm>
+          <a:prstGeom prst="flowChartDocument">
+            <a:avLst/>
+          </a:prstGeom>
+          <a:solidFill>
+            <a:srgbClr val="F79646"/>
+          </a:solidFill>
+          <a:ln>
+            <a:headEnd type="none" w="med" len="med"/>
+            <a:tailEnd type="none" w="med" len="med"/>
+          </a:ln>
+        </p:spPr>
+        <p:style>
+          <a:lnRef idx="0">
+            <a:schemeClr val="accent1"/>
+          </a:lnRef>
+          <a:fillRef idx="3">
+            <a:schemeClr val="accent1"/>
+          </a:fillRef>
+          <a:effectRef idx="3">
+            <a:schemeClr val="accent1"/>
+          </a:effectRef>
+          <a:fontRef idx="minor">
+            <a:schemeClr val="lt1"/>
+          </a:fontRef>
+        </p:style>
+        <p:txBody>
+          <a:bodyPr/>
+          <a:lstStyle>
+            <a:defPPr>
+              <a:defRPr lang="en-US"/>
+            </a:defPPr>
+            <a:lvl1pPr algn="l" rtl="0" fontAlgn="base">
+              <a:spcBef>
+                <a:spcPct val="20000"/>
+              </a:spcBef>
+              <a:spcAft>
+                <a:spcPct val="0"/>
+              </a:spcAft>
+              <a:buSzPct val="100000"/>
+              <a:buFont typeface="Arial" charset="0"/>
+              <a:buChar char="•"/>
+              <a:defRPr kern="1200">
+                <a:solidFill>
+                  <a:schemeClr val="dk1"/>
+                </a:solidFill>
+                <a:latin typeface="+mn-lt"/>
+                <a:ea typeface="+mn-ea"/>
+                <a:cs typeface="+mn-cs"/>
+              </a:defRPr>
+            </a:lvl1pPr>
+            <a:lvl2pPr marL="457200" algn="l" rtl="0" fontAlgn="base">
+              <a:spcBef>
+                <a:spcPct val="20000"/>
+              </a:spcBef>
+              <a:spcAft>
+                <a:spcPct val="0"/>
+              </a:spcAft>
+              <a:buSzPct val="100000"/>
+              <a:buFont typeface="Arial" charset="0"/>
+              <a:buChar char="•"/>
+              <a:defRPr kern="1200">
+                <a:solidFill>
+                  <a:schemeClr val="dk1"/>
+                </a:solidFill>
+                <a:latin typeface="+mn-lt"/>
+                <a:ea typeface="+mn-ea"/>
+                <a:cs typeface="+mn-cs"/>
+              </a:defRPr>
+            </a:lvl2pPr>
+            <a:lvl3pPr marL="914400" algn="l" rtl="0" fontAlgn="base">
+              <a:spcBef>
+                <a:spcPct val="20000"/>
+              </a:spcBef>
+              <a:spcAft>
+                <a:spcPct val="0"/>
+              </a:spcAft>
+              <a:buSzPct val="100000"/>
+              <a:buFont typeface="Arial" charset="0"/>
+              <a:buChar char="•"/>
+              <a:defRPr kern="1200">
+                <a:solidFill>
+                  <a:schemeClr val="dk1"/>
+                </a:solidFill>
+                <a:latin typeface="+mn-lt"/>
+                <a:ea typeface="+mn-ea"/>
+                <a:cs typeface="+mn-cs"/>
+              </a:defRPr>
+            </a:lvl3pPr>
+            <a:lvl4pPr marL="1371600" algn="l" rtl="0" fontAlgn="base">
+              <a:spcBef>
+                <a:spcPct val="20000"/>
+              </a:spcBef>
+              <a:spcAft>
+                <a:spcPct val="0"/>
+              </a:spcAft>
+              <a:buSzPct val="100000"/>
+              <a:buFont typeface="Arial" charset="0"/>
+              <a:buChar char="•"/>
+              <a:defRPr kern="1200">
+                <a:solidFill>
+                  <a:schemeClr val="dk1"/>
+                </a:solidFill>
+                <a:latin typeface="+mn-lt"/>
+                <a:ea typeface="+mn-ea"/>
+                <a:cs typeface="+mn-cs"/>
+              </a:defRPr>
+            </a:lvl4pPr>
+            <a:lvl5pPr marL="1828800" algn="l" rtl="0" fontAlgn="base">
+              <a:spcBef>
+                <a:spcPct val="20000"/>
+              </a:spcBef>
+              <a:spcAft>
+                <a:spcPct val="0"/>
+              </a:spcAft>
+              <a:buSzPct val="100000"/>
+              <a:buFont typeface="Arial" charset="0"/>
+              <a:buChar char="•"/>
+              <a:defRPr kern="1200">
+                <a:solidFill>
+                  <a:schemeClr val="dk1"/>
+                </a:solidFill>
+                <a:latin typeface="+mn-lt"/>
+                <a:ea typeface="+mn-ea"/>
+                <a:cs typeface="+mn-cs"/>
+              </a:defRPr>
+            </a:lvl5pPr>
+            <a:lvl6pPr marL="2286000" algn="l" defTabSz="914400" rtl="0" eaLnBrk="1" latinLnBrk="0" hangingPunct="1">
+              <a:defRPr kern="1200">
+                <a:solidFill>
+                  <a:schemeClr val="dk1"/>
+                </a:solidFill>
+                <a:latin typeface="+mn-lt"/>
+                <a:ea typeface="+mn-ea"/>
+                <a:cs typeface="+mn-cs"/>
+              </a:defRPr>
+            </a:lvl6pPr>
+            <a:lvl7pPr marL="2743200" algn="l" defTabSz="914400" rtl="0" eaLnBrk="1" latinLnBrk="0" hangingPunct="1">
+              <a:defRPr kern="1200">
+                <a:solidFill>
+                  <a:schemeClr val="dk1"/>
+                </a:solidFill>
+                <a:latin typeface="+mn-lt"/>
+                <a:ea typeface="+mn-ea"/>
+                <a:cs typeface="+mn-cs"/>
+              </a:defRPr>
+            </a:lvl7pPr>
+            <a:lvl8pPr marL="3200400" algn="l" defTabSz="914400" rtl="0" eaLnBrk="1" latinLnBrk="0" hangingPunct="1">
+              <a:defRPr kern="1200">
+                <a:solidFill>
+                  <a:schemeClr val="dk1"/>
+                </a:solidFill>
+                <a:latin typeface="+mn-lt"/>
+                <a:ea typeface="+mn-ea"/>
+                <a:cs typeface="+mn-cs"/>
+              </a:defRPr>
+            </a:lvl8pPr>
+            <a:lvl9pPr marL="3657600" algn="l" defTabSz="914400" rtl="0" eaLnBrk="1" latinLnBrk="0" hangingPunct="1">
+              <a:defRPr kern="1200">
+                <a:solidFill>
+                  <a:schemeClr val="dk1"/>
+                </a:solidFill>
+                <a:latin typeface="+mn-lt"/>
+                <a:ea typeface="+mn-ea"/>
+                <a:cs typeface="+mn-cs"/>
+              </a:defRPr>
+            </a:lvl9pPr>
+          </a:lstStyle>
+          <a:p>
+            <a:pPr>
+              <a:defRPr/>
+            </a:pPr>
+            <a:endParaRPr lang="en-US">
+              <a:solidFill>
+                <a:srgbClr val="000000"/>
+              </a:solidFill>
+            </a:endParaRPr>
+          </a:p>
+        </p:txBody>
+      </p:sp>
+      <p:sp>
+        <p:nvSpPr>
+          <p:cNvPr id="71" name="Flowchart: Document 70"/>
+          <p:cNvSpPr/>
+          <p:nvPr/>
+        </p:nvSpPr>
+        <p:spPr bwMode="auto">
+          <a:xfrm>
+            <a:off x="3411801" y="5435181"/>
+            <a:ext cx="81012" cy="202530"/>
+          </a:xfrm>
+          <a:prstGeom prst="flowChartDocument">
+            <a:avLst/>
+          </a:prstGeom>
+          <a:solidFill>
+            <a:srgbClr val="F79646"/>
+          </a:solidFill>
+          <a:ln>
+            <a:headEnd type="none" w="med" len="med"/>
+            <a:tailEnd type="none" w="med" len="med"/>
+          </a:ln>
+        </p:spPr>
+        <p:style>
+          <a:lnRef idx="0">
+            <a:schemeClr val="accent1"/>
+          </a:lnRef>
+          <a:fillRef idx="3">
+            <a:schemeClr val="accent1"/>
+          </a:fillRef>
+          <a:effectRef idx="3">
+            <a:schemeClr val="accent1"/>
+          </a:effectRef>
+          <a:fontRef idx="minor">
+            <a:schemeClr val="lt1"/>
+          </a:fontRef>
+        </p:style>
+        <p:txBody>
+          <a:bodyPr/>
+          <a:lstStyle>
+            <a:defPPr>
+              <a:defRPr lang="en-US"/>
+            </a:defPPr>
+            <a:lvl1pPr algn="l" rtl="0" fontAlgn="base">
+              <a:spcBef>
+                <a:spcPct val="20000"/>
+              </a:spcBef>
+              <a:spcAft>
+                <a:spcPct val="0"/>
+              </a:spcAft>
+              <a:buSzPct val="100000"/>
+              <a:buFont typeface="Arial" charset="0"/>
+              <a:buChar char="•"/>
+              <a:defRPr kern="1200">
+                <a:solidFill>
+                  <a:schemeClr val="dk1"/>
+                </a:solidFill>
+                <a:latin typeface="+mn-lt"/>
+                <a:ea typeface="+mn-ea"/>
+                <a:cs typeface="+mn-cs"/>
+              </a:defRPr>
+            </a:lvl1pPr>
+            <a:lvl2pPr marL="457200" algn="l" rtl="0" fontAlgn="base">
+              <a:spcBef>
+                <a:spcPct val="20000"/>
+              </a:spcBef>
+              <a:spcAft>
+                <a:spcPct val="0"/>
+              </a:spcAft>
+              <a:buSzPct val="100000"/>
+              <a:buFont typeface="Arial" charset="0"/>
+              <a:buChar char="•"/>
+              <a:defRPr kern="1200">
+                <a:solidFill>
+                  <a:schemeClr val="dk1"/>
+                </a:solidFill>
+                <a:latin typeface="+mn-lt"/>
+                <a:ea typeface="+mn-ea"/>
+                <a:cs typeface="+mn-cs"/>
+              </a:defRPr>
+            </a:lvl2pPr>
+            <a:lvl3pPr marL="914400" algn="l" rtl="0" fontAlgn="base">
+              <a:spcBef>
+                <a:spcPct val="20000"/>
+              </a:spcBef>
+              <a:spcAft>
+                <a:spcPct val="0"/>
+              </a:spcAft>
+              <a:buSzPct val="100000"/>
+              <a:buFont typeface="Arial" charset="0"/>
+              <a:buChar char="•"/>
+              <a:defRPr kern="1200">
+                <a:solidFill>
+                  <a:schemeClr val="dk1"/>
+                </a:solidFill>
+                <a:latin typeface="+mn-lt"/>
+                <a:ea typeface="+mn-ea"/>
+                <a:cs typeface="+mn-cs"/>
+              </a:defRPr>
+            </a:lvl3pPr>
+            <a:lvl4pPr marL="1371600" algn="l" rtl="0" fontAlgn="base">
+              <a:spcBef>
+                <a:spcPct val="20000"/>
+              </a:spcBef>
+              <a:spcAft>
+                <a:spcPct val="0"/>
+              </a:spcAft>
+              <a:buSzPct val="100000"/>
+              <a:buFont typeface="Arial" charset="0"/>
+              <a:buChar char="•"/>
+              <a:defRPr kern="1200">
+                <a:solidFill>
+                  <a:schemeClr val="dk1"/>
+                </a:solidFill>
+                <a:latin typeface="+mn-lt"/>
+                <a:ea typeface="+mn-ea"/>
+                <a:cs typeface="+mn-cs"/>
+              </a:defRPr>
+            </a:lvl4pPr>
+            <a:lvl5pPr marL="1828800" algn="l" rtl="0" fontAlgn="base">
+              <a:spcBef>
+                <a:spcPct val="20000"/>
+              </a:spcBef>
+              <a:spcAft>
+                <a:spcPct val="0"/>
+              </a:spcAft>
+              <a:buSzPct val="100000"/>
+              <a:buFont typeface="Arial" charset="0"/>
+              <a:buChar char="•"/>
+              <a:defRPr kern="1200">
+                <a:solidFill>
+                  <a:schemeClr val="dk1"/>
+                </a:solidFill>
+                <a:latin typeface="+mn-lt"/>
+                <a:ea typeface="+mn-ea"/>
+                <a:cs typeface="+mn-cs"/>
+              </a:defRPr>
+            </a:lvl5pPr>
+            <a:lvl6pPr marL="2286000" algn="l" defTabSz="914400" rtl="0" eaLnBrk="1" latinLnBrk="0" hangingPunct="1">
+              <a:defRPr kern="1200">
+                <a:solidFill>
+                  <a:schemeClr val="dk1"/>
+                </a:solidFill>
+                <a:latin typeface="+mn-lt"/>
+                <a:ea typeface="+mn-ea"/>
+                <a:cs typeface="+mn-cs"/>
+              </a:defRPr>
+            </a:lvl6pPr>
+            <a:lvl7pPr marL="2743200" algn="l" defTabSz="914400" rtl="0" eaLnBrk="1" latinLnBrk="0" hangingPunct="1">
+              <a:defRPr kern="1200">
+                <a:solidFill>
+                  <a:schemeClr val="dk1"/>
+                </a:solidFill>
+                <a:latin typeface="+mn-lt"/>
+                <a:ea typeface="+mn-ea"/>
+                <a:cs typeface="+mn-cs"/>
+              </a:defRPr>
+            </a:lvl7pPr>
+            <a:lvl8pPr marL="3200400" algn="l" defTabSz="914400" rtl="0" eaLnBrk="1" latinLnBrk="0" hangingPunct="1">
+              <a:defRPr kern="1200">
+                <a:solidFill>
+                  <a:schemeClr val="dk1"/>
+                </a:solidFill>
+                <a:latin typeface="+mn-lt"/>
+                <a:ea typeface="+mn-ea"/>
+                <a:cs typeface="+mn-cs"/>
+              </a:defRPr>
+            </a:lvl8pPr>
+            <a:lvl9pPr marL="3657600" algn="l" defTabSz="914400" rtl="0" eaLnBrk="1" latinLnBrk="0" hangingPunct="1">
+              <a:defRPr kern="1200">
+                <a:solidFill>
+                  <a:schemeClr val="dk1"/>
+                </a:solidFill>
+                <a:latin typeface="+mn-lt"/>
+                <a:ea typeface="+mn-ea"/>
+                <a:cs typeface="+mn-cs"/>
+              </a:defRPr>
+            </a:lvl9pPr>
+          </a:lstStyle>
+          <a:p>
+            <a:pPr>
+              <a:defRPr/>
+            </a:pPr>
+            <a:endParaRPr lang="en-US">
+              <a:solidFill>
+                <a:srgbClr val="000000"/>
+              </a:solidFill>
+            </a:endParaRPr>
+          </a:p>
+        </p:txBody>
+      </p:sp>
+      <p:sp>
+        <p:nvSpPr>
+          <p:cNvPr id="72" name="Flowchart: Document 71"/>
+          <p:cNvSpPr/>
+          <p:nvPr/>
+        </p:nvSpPr>
+        <p:spPr bwMode="auto">
+          <a:xfrm>
+            <a:off x="2934604" y="5461546"/>
+            <a:ext cx="81012" cy="202530"/>
+          </a:xfrm>
+          <a:prstGeom prst="flowChartDocument">
+            <a:avLst/>
+          </a:prstGeom>
+          <a:solidFill>
+            <a:srgbClr val="F79646"/>
+          </a:solidFill>
+          <a:ln>
+            <a:headEnd type="none" w="med" len="med"/>
+            <a:tailEnd type="none" w="med" len="med"/>
+          </a:ln>
+        </p:spPr>
+        <p:style>
+          <a:lnRef idx="0">
+            <a:schemeClr val="accent1"/>
+          </a:lnRef>
+          <a:fillRef idx="3">
+            <a:schemeClr val="accent1"/>
+          </a:fillRef>
+          <a:effectRef idx="3">
+            <a:schemeClr val="accent1"/>
+          </a:effectRef>
+          <a:fontRef idx="minor">
+            <a:schemeClr val="lt1"/>
+          </a:fontRef>
+        </p:style>
+        <p:txBody>
+          <a:bodyPr/>
+          <a:lstStyle>
+            <a:defPPr>
+              <a:defRPr lang="en-US"/>
+            </a:defPPr>
+            <a:lvl1pPr algn="l" rtl="0" fontAlgn="base">
+              <a:spcBef>
+                <a:spcPct val="20000"/>
+              </a:spcBef>
+              <a:spcAft>
+                <a:spcPct val="0"/>
+              </a:spcAft>
+              <a:buSzPct val="100000"/>
+              <a:buFont typeface="Arial" charset="0"/>
+              <a:buChar char="•"/>
+              <a:defRPr kern="1200">
+                <a:solidFill>
+                  <a:schemeClr val="dk1"/>
+                </a:solidFill>
+                <a:latin typeface="+mn-lt"/>
+                <a:ea typeface="+mn-ea"/>
+                <a:cs typeface="+mn-cs"/>
+              </a:defRPr>
+            </a:lvl1pPr>
+            <a:lvl2pPr marL="457200" algn="l" rtl="0" fontAlgn="base">
+              <a:spcBef>
+                <a:spcPct val="20000"/>
+              </a:spcBef>
+              <a:spcAft>
+                <a:spcPct val="0"/>
+              </a:spcAft>
+              <a:buSzPct val="100000"/>
+              <a:buFont typeface="Arial" charset="0"/>
+              <a:buChar char="•"/>
+              <a:defRPr kern="1200">
+                <a:solidFill>
+                  <a:schemeClr val="dk1"/>
+                </a:solidFill>
+                <a:latin typeface="+mn-lt"/>
+                <a:ea typeface="+mn-ea"/>
+                <a:cs typeface="+mn-cs"/>
+              </a:defRPr>
+            </a:lvl2pPr>
+            <a:lvl3pPr marL="914400" algn="l" rtl="0" fontAlgn="base">
+              <a:spcBef>
+                <a:spcPct val="20000"/>
+              </a:spcBef>
+              <a:spcAft>
+                <a:spcPct val="0"/>
+              </a:spcAft>
+              <a:buSzPct val="100000"/>
+              <a:buFont typeface="Arial" charset="0"/>
+              <a:buChar char="•"/>
+              <a:defRPr kern="1200">
+                <a:solidFill>
+                  <a:schemeClr val="dk1"/>
+                </a:solidFill>
+                <a:latin typeface="+mn-lt"/>
+                <a:ea typeface="+mn-ea"/>
+                <a:cs typeface="+mn-cs"/>
+              </a:defRPr>
+            </a:lvl3pPr>
+            <a:lvl4pPr marL="1371600" algn="l" rtl="0" fontAlgn="base">
+              <a:spcBef>
+                <a:spcPct val="20000"/>
+              </a:spcBef>
+              <a:spcAft>
+                <a:spcPct val="0"/>
+              </a:spcAft>
+              <a:buSzPct val="100000"/>
+              <a:buFont typeface="Arial" charset="0"/>
+              <a:buChar char="•"/>
+              <a:defRPr kern="1200">
+                <a:solidFill>
+                  <a:schemeClr val="dk1"/>
+                </a:solidFill>
+                <a:latin typeface="+mn-lt"/>
+                <a:ea typeface="+mn-ea"/>
+                <a:cs typeface="+mn-cs"/>
+              </a:defRPr>
+            </a:lvl4pPr>
+            <a:lvl5pPr marL="1828800" algn="l" rtl="0" fontAlgn="base">
+              <a:spcBef>
+                <a:spcPct val="20000"/>
+              </a:spcBef>
+              <a:spcAft>
+                <a:spcPct val="0"/>
+              </a:spcAft>
+              <a:buSzPct val="100000"/>
+              <a:buFont typeface="Arial" charset="0"/>
+              <a:buChar char="•"/>
+              <a:defRPr kern="1200">
+                <a:solidFill>
+                  <a:schemeClr val="dk1"/>
+                </a:solidFill>
+                <a:latin typeface="+mn-lt"/>
+                <a:ea typeface="+mn-ea"/>
+                <a:cs typeface="+mn-cs"/>
+              </a:defRPr>
+            </a:lvl5pPr>
+            <a:lvl6pPr marL="2286000" algn="l" defTabSz="914400" rtl="0" eaLnBrk="1" latinLnBrk="0" hangingPunct="1">
+              <a:defRPr kern="1200">
+                <a:solidFill>
+                  <a:schemeClr val="dk1"/>
+                </a:solidFill>
+                <a:latin typeface="+mn-lt"/>
+                <a:ea typeface="+mn-ea"/>
+                <a:cs typeface="+mn-cs"/>
+              </a:defRPr>
+            </a:lvl6pPr>
+            <a:lvl7pPr marL="2743200" algn="l" defTabSz="914400" rtl="0" eaLnBrk="1" latinLnBrk="0" hangingPunct="1">
+              <a:defRPr kern="1200">
+                <a:solidFill>
+                  <a:schemeClr val="dk1"/>
+                </a:solidFill>
+                <a:latin typeface="+mn-lt"/>
+                <a:ea typeface="+mn-ea"/>
+                <a:cs typeface="+mn-cs"/>
+              </a:defRPr>
+            </a:lvl7pPr>
+            <a:lvl8pPr marL="3200400" algn="l" defTabSz="914400" rtl="0" eaLnBrk="1" latinLnBrk="0" hangingPunct="1">
+              <a:defRPr kern="1200">
+                <a:solidFill>
+                  <a:schemeClr val="dk1"/>
+                </a:solidFill>
+                <a:latin typeface="+mn-lt"/>
+                <a:ea typeface="+mn-ea"/>
+                <a:cs typeface="+mn-cs"/>
+              </a:defRPr>
+            </a:lvl8pPr>
+            <a:lvl9pPr marL="3657600" algn="l" defTabSz="914400" rtl="0" eaLnBrk="1" latinLnBrk="0" hangingPunct="1">
+              <a:defRPr kern="1200">
+                <a:solidFill>
+                  <a:schemeClr val="dk1"/>
+                </a:solidFill>
+                <a:latin typeface="+mn-lt"/>
+                <a:ea typeface="+mn-ea"/>
+                <a:cs typeface="+mn-cs"/>
+              </a:defRPr>
+            </a:lvl9pPr>
+          </a:lstStyle>
+          <a:p>
+            <a:pPr>
+              <a:defRPr/>
+            </a:pPr>
+            <a:endParaRPr lang="en-US">
+              <a:solidFill>
+                <a:srgbClr val="000000"/>
+              </a:solidFill>
+            </a:endParaRPr>
+          </a:p>
+        </p:txBody>
+      </p:sp>
+      <p:sp>
+        <p:nvSpPr>
+          <p:cNvPr id="16" name="Double Bracket 15"/>
+          <p:cNvSpPr/>
+          <p:nvPr/>
+        </p:nvSpPr>
+        <p:spPr>
+          <a:xfrm>
+            <a:off x="3319151" y="4604143"/>
+            <a:ext cx="771591" cy="2045303"/>
+          </a:xfrm>
+          <a:prstGeom prst="bracketPair">
+            <a:avLst/>
+          </a:prstGeom>
+          <a:ln w="28575">
+            <a:solidFill>
+              <a:schemeClr val="accent1">
+                <a:lumMod val="75000"/>
+              </a:schemeClr>
+            </a:solidFill>
+            <a:prstDash val="sysDot"/>
+          </a:ln>
+        </p:spPr>
+        <p:style>
+          <a:lnRef idx="1">
+            <a:schemeClr val="accent1"/>
+          </a:lnRef>
+          <a:fillRef idx="0">
+            <a:schemeClr val="accent1"/>
+          </a:fillRef>
+          <a:effectRef idx="0">
+            <a:schemeClr val="accent1"/>
+          </a:effectRef>
+          <a:fontRef idx="minor">
+            <a:schemeClr val="tx1"/>
+          </a:fontRef>
+        </p:style>
+        <p:txBody>
+          <a:bodyPr rtlCol="0" anchor="t"/>
+          <a:lstStyle/>
+          <a:p>
+            <a:pPr algn="ctr"/>
+            <a:r>
+              <a:rPr lang="en-CA" sz="1400" dirty="0" smtClean="0"/>
+              <a:t>TCP Routes</a:t>
+            </a:r>
+          </a:p>
+        </p:txBody>
+      </p:sp>
+    </p:spTree>
+    <p:extLst>
+      <p:ext uri="{BB962C8B-B14F-4D97-AF65-F5344CB8AC3E}">
+        <p14:creationId xmlns:p14="http://schemas.microsoft.com/office/powerpoint/2010/main" val="3001485434"/>
       </p:ext>
     </p:extLst>
   </p:cSld>

</xml_diff>